<commit_message>
added new lines on poster
</commit_message>
<xml_diff>
--- a/poster1.pptx
+++ b/poster1.pptx
@@ -289,7 +289,7 @@
             <a:fld id="{8ACDB3CC-F982-40F9-8DD6-BCC9AFBF44BD}" type="datetime1">
               <a:rPr lang="en-US" smtClean="0"/>
               <a:pPr/>
-              <a:t>6/6/15</a:t>
+              <a:t>6/7/15</a:t>
             </a:fld>
             <a:endParaRPr lang="en-US" dirty="0"/>
           </a:p>
@@ -459,7 +459,7 @@
           <a:p>
             <a:fld id="{68C2560D-EC28-3B41-86E8-18F1CE0113B4}" type="datetimeFigureOut">
               <a:rPr lang="en-US" smtClean="0"/>
-              <a:t>6/6/15</a:t>
+              <a:t>6/7/15</a:t>
             </a:fld>
             <a:endParaRPr lang="en-US"/>
           </a:p>
@@ -639,7 +639,7 @@
           <a:p>
             <a:fld id="{68C2560D-EC28-3B41-86E8-18F1CE0113B4}" type="datetimeFigureOut">
               <a:rPr lang="en-US" smtClean="0"/>
-              <a:t>6/6/15</a:t>
+              <a:t>6/7/15</a:t>
             </a:fld>
             <a:endParaRPr lang="en-US"/>
           </a:p>
@@ -809,7 +809,7 @@
           <a:p>
             <a:fld id="{68C2560D-EC28-3B41-86E8-18F1CE0113B4}" type="datetimeFigureOut">
               <a:rPr lang="en-US" smtClean="0"/>
-              <a:t>6/6/15</a:t>
+              <a:t>6/7/15</a:t>
             </a:fld>
             <a:endParaRPr lang="en-US"/>
           </a:p>
@@ -1056,7 +1056,7 @@
             <a:fld id="{4A9E7B99-7C3F-4BC3-B7B8-7E1F8C620B24}" type="datetime1">
               <a:rPr lang="en-US" smtClean="0"/>
               <a:pPr/>
-              <a:t>6/6/15</a:t>
+              <a:t>6/7/15</a:t>
             </a:fld>
             <a:endParaRPr lang="en-US"/>
           </a:p>
@@ -1345,7 +1345,7 @@
           <a:p>
             <a:fld id="{68C2560D-EC28-3B41-86E8-18F1CE0113B4}" type="datetimeFigureOut">
               <a:rPr lang="en-US" smtClean="0"/>
-              <a:t>6/6/15</a:t>
+              <a:t>6/7/15</a:t>
             </a:fld>
             <a:endParaRPr lang="en-US"/>
           </a:p>
@@ -1767,7 +1767,7 @@
           <a:p>
             <a:fld id="{68C2560D-EC28-3B41-86E8-18F1CE0113B4}" type="datetimeFigureOut">
               <a:rPr lang="en-US" smtClean="0"/>
-              <a:t>6/6/15</a:t>
+              <a:t>6/7/15</a:t>
             </a:fld>
             <a:endParaRPr lang="en-US"/>
           </a:p>
@@ -1885,7 +1885,7 @@
           <a:p>
             <a:fld id="{68C2560D-EC28-3B41-86E8-18F1CE0113B4}" type="datetimeFigureOut">
               <a:rPr lang="en-US" smtClean="0"/>
-              <a:t>6/6/15</a:t>
+              <a:t>6/7/15</a:t>
             </a:fld>
             <a:endParaRPr lang="en-US"/>
           </a:p>
@@ -1980,7 +1980,7 @@
           <a:p>
             <a:fld id="{68C2560D-EC28-3B41-86E8-18F1CE0113B4}" type="datetimeFigureOut">
               <a:rPr lang="en-US" smtClean="0"/>
-              <a:t>6/6/15</a:t>
+              <a:t>6/7/15</a:t>
             </a:fld>
             <a:endParaRPr lang="en-US"/>
           </a:p>
@@ -2257,7 +2257,7 @@
           <a:p>
             <a:fld id="{68C2560D-EC28-3B41-86E8-18F1CE0113B4}" type="datetimeFigureOut">
               <a:rPr lang="en-US" smtClean="0"/>
-              <a:t>6/6/15</a:t>
+              <a:t>6/7/15</a:t>
             </a:fld>
             <a:endParaRPr lang="en-US"/>
           </a:p>
@@ -2517,7 +2517,7 @@
           <a:p>
             <a:fld id="{68C2560D-EC28-3B41-86E8-18F1CE0113B4}" type="datetimeFigureOut">
               <a:rPr lang="en-US" smtClean="0"/>
-              <a:t>6/6/15</a:t>
+              <a:t>6/7/15</a:t>
             </a:fld>
             <a:endParaRPr lang="en-US"/>
           </a:p>
@@ -2730,7 +2730,7 @@
           <a:p>
             <a:fld id="{68C2560D-EC28-3B41-86E8-18F1CE0113B4}" type="datetimeFigureOut">
               <a:rPr lang="en-US" smtClean="0"/>
-              <a:t>6/6/15</a:t>
+              <a:t>6/7/15</a:t>
             </a:fld>
             <a:endParaRPr lang="en-US"/>
           </a:p>
@@ -3138,18 +3138,30 @@
               </a:lnSpc>
             </a:pPr>
             <a:r>
-              <a:rPr lang="en-US" sz="8000" dirty="0" smtClean="0"/>
+              <a:rPr lang="en-US" sz="8000" dirty="0" smtClean="0">
+                <a:latin typeface="Trebuchet MS"/>
+                <a:cs typeface="Trebuchet MS"/>
+              </a:rPr>
               <a:t>Exploratory data analysis of taxonomic and functional </a:t>
             </a:r>
             <a:r>
-              <a:rPr lang="en-US" sz="8000" dirty="0" err="1" smtClean="0"/>
+              <a:rPr lang="en-US" sz="8000" dirty="0" err="1" smtClean="0">
+                <a:latin typeface="Trebuchet MS"/>
+                <a:cs typeface="Trebuchet MS"/>
+              </a:rPr>
               <a:t>metagenomic</a:t>
             </a:r>
             <a:r>
-              <a:rPr lang="en-US" sz="8000" dirty="0" smtClean="0"/>
+              <a:rPr lang="en-US" sz="8000" dirty="0" smtClean="0">
+                <a:latin typeface="Trebuchet MS"/>
+                <a:cs typeface="Trebuchet MS"/>
+              </a:rPr>
               <a:t> data</a:t>
             </a:r>
-            <a:endParaRPr lang="en-US" sz="8000" dirty="0"/>
+            <a:endParaRPr lang="en-US" sz="8000" dirty="0">
+              <a:latin typeface="Trebuchet MS"/>
+              <a:cs typeface="Trebuchet MS"/>
+            </a:endParaRPr>
           </a:p>
         </p:txBody>
       </p:sp>
@@ -3205,18 +3217,30 @@
           <a:lstStyle/>
           <a:p>
             <a:r>
-              <a:rPr lang="en-US" sz="5400" dirty="0" smtClean="0"/>
+              <a:rPr lang="en-US" sz="5400" dirty="0" smtClean="0">
+                <a:latin typeface="Trebuchet MS"/>
+                <a:cs typeface="Trebuchet MS"/>
+              </a:rPr>
               <a:t>Alex </a:t>
             </a:r>
             <a:r>
-              <a:rPr lang="en-US" sz="5400" dirty="0" err="1" smtClean="0"/>
+              <a:rPr lang="en-US" sz="5400" dirty="0" err="1" smtClean="0">
+                <a:latin typeface="Trebuchet MS"/>
+                <a:cs typeface="Trebuchet MS"/>
+              </a:rPr>
               <a:t>Eng</a:t>
             </a:r>
             <a:r>
-              <a:rPr lang="en-US" sz="5400" dirty="0" smtClean="0"/>
+              <a:rPr lang="en-US" sz="5400" dirty="0" smtClean="0">
+                <a:latin typeface="Trebuchet MS"/>
+                <a:cs typeface="Trebuchet MS"/>
+              </a:rPr>
               <a:t>, Will Gagne-Maynard, Colin McNally, Cecilia Noecker</a:t>
             </a:r>
-            <a:endParaRPr lang="en-US" sz="5400" dirty="0"/>
+            <a:endParaRPr lang="en-US" sz="5400" dirty="0">
+              <a:latin typeface="Trebuchet MS"/>
+              <a:cs typeface="Trebuchet MS"/>
+            </a:endParaRPr>
           </a:p>
         </p:txBody>
       </p:sp>
@@ -3228,7 +3252,7 @@
         </p:nvSpPr>
         <p:spPr>
           <a:xfrm>
-            <a:off x="476212" y="8229915"/>
+            <a:off x="476212" y="8287044"/>
             <a:ext cx="9087784" cy="15733540"/>
           </a:xfrm>
           <a:prstGeom prst="rect">
@@ -3248,7 +3272,10 @@
               </a:lnSpc>
             </a:pPr>
             <a:r>
-              <a:rPr lang="en-US" sz="3600" dirty="0" smtClean="0"/>
+              <a:rPr lang="en-US" sz="3600" dirty="0" smtClean="0">
+                <a:latin typeface="Trebuchet MS"/>
+                <a:cs typeface="Trebuchet MS"/>
+              </a:rPr>
               <a:t>New technologies enable detailed profiling of the taxonomic and functional composition of microbial communities and the variation in these across different environments.</a:t>
             </a:r>
           </a:p>
@@ -3260,7 +3287,10 @@
               <a:buFont typeface="Arial"/>
               <a:buChar char="•"/>
             </a:pPr>
-            <a:endParaRPr lang="en-US" sz="4000" dirty="0"/>
+            <a:endParaRPr lang="en-US" sz="4000" dirty="0">
+              <a:latin typeface="Trebuchet MS"/>
+              <a:cs typeface="Trebuchet MS"/>
+            </a:endParaRPr>
           </a:p>
           <a:p>
             <a:pPr marL="857250" indent="-857250">
@@ -3270,7 +3300,10 @@
               <a:buFont typeface="Arial"/>
               <a:buChar char="•"/>
             </a:pPr>
-            <a:endParaRPr lang="en-US" sz="4000" dirty="0" smtClean="0"/>
+            <a:endParaRPr lang="en-US" sz="4000" dirty="0" smtClean="0">
+              <a:latin typeface="Trebuchet MS"/>
+              <a:cs typeface="Trebuchet MS"/>
+            </a:endParaRPr>
           </a:p>
           <a:p>
             <a:pPr marL="857250" indent="-857250">
@@ -3280,7 +3313,10 @@
               <a:buFont typeface="Arial"/>
               <a:buChar char="•"/>
             </a:pPr>
-            <a:endParaRPr lang="en-US" sz="4000" dirty="0"/>
+            <a:endParaRPr lang="en-US" sz="4000" dirty="0">
+              <a:latin typeface="Trebuchet MS"/>
+              <a:cs typeface="Trebuchet MS"/>
+            </a:endParaRPr>
           </a:p>
           <a:p>
             <a:pPr marL="857250" indent="-857250">
@@ -3290,7 +3326,10 @@
               <a:buFont typeface="Arial"/>
               <a:buChar char="•"/>
             </a:pPr>
-            <a:endParaRPr lang="en-US" sz="4000" dirty="0" smtClean="0"/>
+            <a:endParaRPr lang="en-US" sz="4000" dirty="0" smtClean="0">
+              <a:latin typeface="Trebuchet MS"/>
+              <a:cs typeface="Trebuchet MS"/>
+            </a:endParaRPr>
           </a:p>
           <a:p>
             <a:pPr marL="857250" indent="-857250">
@@ -3300,7 +3339,10 @@
               <a:buFont typeface="Arial"/>
               <a:buChar char="•"/>
             </a:pPr>
-            <a:endParaRPr lang="en-US" sz="4000" dirty="0"/>
+            <a:endParaRPr lang="en-US" sz="4000" dirty="0">
+              <a:latin typeface="Trebuchet MS"/>
+              <a:cs typeface="Trebuchet MS"/>
+            </a:endParaRPr>
           </a:p>
           <a:p>
             <a:pPr>
@@ -3309,7 +3351,10 @@
               </a:lnSpc>
             </a:pPr>
             <a:r>
-              <a:rPr lang="en-US" sz="3600" b="1" dirty="0" smtClean="0"/>
+              <a:rPr lang="en-US" sz="3600" b="1" dirty="0" smtClean="0">
+                <a:latin typeface="Trebuchet MS"/>
+                <a:cs typeface="Trebuchet MS"/>
+              </a:rPr>
               <a:t>Typical questions to ask about these datasets:</a:t>
             </a:r>
           </a:p>
@@ -3322,7 +3367,10 @@
               <a:buChar char="•"/>
             </a:pPr>
             <a:r>
-              <a:rPr lang="en-US" sz="3600" dirty="0" smtClean="0"/>
+              <a:rPr lang="en-US" sz="3600" dirty="0" smtClean="0">
+                <a:latin typeface="Trebuchet MS"/>
+                <a:cs typeface="Trebuchet MS"/>
+              </a:rPr>
               <a:t>What are the functional differences across samples?</a:t>
             </a:r>
           </a:p>
@@ -3335,7 +3383,10 @@
               <a:buChar char="•"/>
             </a:pPr>
             <a:r>
-              <a:rPr lang="en-US" sz="3600" dirty="0" smtClean="0"/>
+              <a:rPr lang="en-US" sz="3600" dirty="0" smtClean="0">
+                <a:latin typeface="Trebuchet MS"/>
+                <a:cs typeface="Trebuchet MS"/>
+              </a:rPr>
               <a:t>What taxonomic variation accounts for those differences?</a:t>
             </a:r>
           </a:p>
@@ -3348,7 +3399,10 @@
               <a:buChar char="•"/>
             </a:pPr>
             <a:r>
-              <a:rPr lang="en-US" sz="3600" dirty="0" smtClean="0"/>
+              <a:rPr lang="en-US" sz="3600" dirty="0" smtClean="0">
+                <a:latin typeface="Trebuchet MS"/>
+                <a:cs typeface="Trebuchet MS"/>
+              </a:rPr>
               <a:t>Are taxa or functions more variable?</a:t>
             </a:r>
           </a:p>
@@ -3361,7 +3415,10 @@
               <a:buChar char="•"/>
             </a:pPr>
             <a:r>
-              <a:rPr lang="en-US" sz="3600" dirty="0" smtClean="0"/>
+              <a:rPr lang="en-US" sz="3600" dirty="0" smtClean="0">
+                <a:latin typeface="Trebuchet MS"/>
+                <a:cs typeface="Trebuchet MS"/>
+              </a:rPr>
               <a:t>Are particular taxa or functions associated with different study groups?</a:t>
             </a:r>
           </a:p>
@@ -3372,7 +3429,10 @@
               </a:lnSpc>
             </a:pPr>
             <a:r>
-              <a:rPr lang="en-US" sz="3600" b="1" dirty="0" smtClean="0"/>
+              <a:rPr lang="en-US" sz="3600" b="1" dirty="0" smtClean="0">
+                <a:latin typeface="Trebuchet MS"/>
+                <a:cs typeface="Trebuchet MS"/>
+              </a:rPr>
               <a:t>Our tool allows researchers to upload a dataset and interactively explore these questions.</a:t>
             </a:r>
           </a:p>
@@ -3415,8 +3475,8 @@
         </p:nvSpPr>
         <p:spPr>
           <a:xfrm>
-            <a:off x="360172" y="24013542"/>
-            <a:ext cx="6505266" cy="8051437"/>
+            <a:off x="360172" y="25386697"/>
+            <a:ext cx="6505266" cy="6721842"/>
           </a:xfrm>
           <a:prstGeom prst="rect">
             <a:avLst/>
@@ -3427,18 +3487,6 @@
             <a:spAutoFit/>
           </a:bodyPr>
           <a:lstStyle/>
-          <a:p>
-            <a:pPr>
-              <a:lnSpc>
-                <a:spcPct val="120000"/>
-              </a:lnSpc>
-            </a:pPr>
-            <a:r>
-              <a:rPr lang="en-US" sz="3600" b="1" dirty="0" smtClean="0"/>
-              <a:t>Challenges and Previous Work:</a:t>
-            </a:r>
-            <a:endParaRPr lang="en-US" sz="3600" b="1" dirty="0"/>
-          </a:p>
           <a:p>
             <a:pPr marL="571500" indent="-571500">
               <a:lnSpc>
@@ -3448,8 +3496,18 @@
               <a:buChar char="•"/>
             </a:pPr>
             <a:r>
-              <a:rPr lang="en-US" sz="3600" dirty="0" smtClean="0"/>
-              <a:t>Compositional data</a:t>
+              <a:rPr lang="en-US" sz="3600" dirty="0" smtClean="0">
+                <a:latin typeface="Trebuchet MS"/>
+                <a:cs typeface="Trebuchet MS"/>
+              </a:rPr>
+              <a:t>Compositional </a:t>
+            </a:r>
+            <a:r>
+              <a:rPr lang="en-US" sz="3600" dirty="0" smtClean="0">
+                <a:latin typeface="Trebuchet MS"/>
+                <a:cs typeface="Trebuchet MS"/>
+              </a:rPr>
+              <a:t>data</a:t>
             </a:r>
           </a:p>
           <a:p>
@@ -3459,7 +3517,10 @@
               </a:lnSpc>
             </a:pPr>
             <a:r>
-              <a:rPr lang="en-US" sz="3600" dirty="0" smtClean="0"/>
+              <a:rPr lang="en-US" sz="3600" dirty="0" smtClean="0">
+                <a:latin typeface="Trebuchet MS"/>
+                <a:cs typeface="Trebuchet MS"/>
+              </a:rPr>
               <a:t>Stacked bar plots are standard visualization</a:t>
             </a:r>
           </a:p>
@@ -3472,11 +3533,17 @@
               <a:buChar char="•"/>
             </a:pPr>
             <a:r>
-              <a:rPr lang="en-US" sz="3600" dirty="0" smtClean="0"/>
+              <a:rPr lang="en-US" sz="3600" dirty="0" smtClean="0">
+                <a:latin typeface="Trebuchet MS"/>
+                <a:cs typeface="Trebuchet MS"/>
+              </a:rPr>
               <a:t>Summarizing </a:t>
             </a:r>
             <a:r>
-              <a:rPr lang="en-US" sz="3600" dirty="0"/>
+              <a:rPr lang="en-US" sz="3600" dirty="0">
+                <a:latin typeface="Trebuchet MS"/>
+                <a:cs typeface="Trebuchet MS"/>
+              </a:rPr>
               <a:t>by hierarchies of taxa and functions</a:t>
             </a:r>
           </a:p>
@@ -3487,14 +3554,23 @@
               </a:lnSpc>
             </a:pPr>
             <a:r>
-              <a:rPr lang="en-US" sz="3600" dirty="0"/>
+              <a:rPr lang="en-US" sz="3600" dirty="0">
+                <a:latin typeface="Trebuchet MS"/>
+                <a:cs typeface="Trebuchet MS"/>
+              </a:rPr>
               <a:t>Previous example: Krona </a:t>
             </a:r>
             <a:r>
-              <a:rPr lang="en-US" sz="3600" dirty="0" smtClean="0"/>
+              <a:rPr lang="en-US" sz="3600" dirty="0" smtClean="0">
+                <a:latin typeface="Trebuchet MS"/>
+                <a:cs typeface="Trebuchet MS"/>
+              </a:rPr>
               <a:t>plots</a:t>
             </a:r>
-            <a:endParaRPr lang="en-US" sz="3600" dirty="0"/>
+            <a:endParaRPr lang="en-US" sz="3600" dirty="0">
+              <a:latin typeface="Trebuchet MS"/>
+              <a:cs typeface="Trebuchet MS"/>
+            </a:endParaRPr>
           </a:p>
           <a:p>
             <a:pPr marL="571500" indent="-571500">
@@ -3505,7 +3581,10 @@
               <a:buChar char="•"/>
             </a:pPr>
             <a:r>
-              <a:rPr lang="en-US" sz="3600" dirty="0"/>
+              <a:rPr lang="en-US" sz="3600" dirty="0">
+                <a:latin typeface="Trebuchet MS"/>
+                <a:cs typeface="Trebuchet MS"/>
+              </a:rPr>
               <a:t>Complex relationships between taxa and functions</a:t>
             </a:r>
           </a:p>
@@ -3516,23 +3595,38 @@
               </a:lnSpc>
             </a:pPr>
             <a:r>
-              <a:rPr lang="en-US" sz="3600" dirty="0"/>
+              <a:rPr lang="en-US" sz="3600" dirty="0">
+                <a:latin typeface="Trebuchet MS"/>
+                <a:cs typeface="Trebuchet MS"/>
+              </a:rPr>
               <a:t>Previous example: </a:t>
             </a:r>
             <a:r>
-              <a:rPr lang="en-US" sz="3600" dirty="0" err="1" smtClean="0"/>
+              <a:rPr lang="en-US" sz="3600" dirty="0" err="1" smtClean="0">
+                <a:latin typeface="Trebuchet MS"/>
+                <a:cs typeface="Trebuchet MS"/>
+              </a:rPr>
               <a:t>FiShTaCo</a:t>
             </a:r>
             <a:r>
-              <a:rPr lang="en-US" sz="3600" dirty="0" smtClean="0"/>
+              <a:rPr lang="en-US" sz="3600" dirty="0" smtClean="0">
+                <a:latin typeface="Trebuchet MS"/>
+                <a:cs typeface="Trebuchet MS"/>
+              </a:rPr>
               <a:t> </a:t>
             </a:r>
             <a:r>
-              <a:rPr lang="en-US" sz="3600" dirty="0"/>
+              <a:rPr lang="en-US" sz="3600" dirty="0">
+                <a:latin typeface="Trebuchet MS"/>
+                <a:cs typeface="Trebuchet MS"/>
+              </a:rPr>
               <a:t>differential </a:t>
             </a:r>
             <a:r>
-              <a:rPr lang="en-US" sz="3600" dirty="0" smtClean="0"/>
+              <a:rPr lang="en-US" sz="3600" dirty="0" smtClean="0">
+                <a:latin typeface="Trebuchet MS"/>
+                <a:cs typeface="Trebuchet MS"/>
+              </a:rPr>
               <a:t>contributions</a:t>
             </a:r>
           </a:p>
@@ -3613,7 +3707,10 @@
           <a:lstStyle/>
           <a:p>
             <a:r>
-              <a:rPr lang="en-US" sz="6600" dirty="0"/>
+              <a:rPr lang="en-US" sz="6600" dirty="0">
+                <a:latin typeface="Trebuchet MS"/>
+                <a:cs typeface="Trebuchet MS"/>
+              </a:rPr>
               <a:t>Motivation and Problem</a:t>
             </a:r>
           </a:p>
@@ -3634,7 +3731,7 @@
         </p:blipFill>
         <p:spPr>
           <a:xfrm>
-            <a:off x="6825933" y="24179105"/>
+            <a:off x="7148821" y="24020584"/>
             <a:ext cx="4334829" cy="2409959"/>
           </a:xfrm>
           <a:prstGeom prst="rect">
@@ -3671,10 +3768,16 @@
           <a:p>
             <a:pPr algn="ctr"/>
             <a:r>
-              <a:rPr lang="en-US" sz="6600" dirty="0" smtClean="0"/>
+              <a:rPr lang="en-US" sz="6600" dirty="0" smtClean="0">
+                <a:latin typeface="Trebuchet MS"/>
+                <a:cs typeface="Trebuchet MS"/>
+              </a:rPr>
               <a:t>Approach and Results</a:t>
             </a:r>
-            <a:endParaRPr lang="en-US" sz="6600" dirty="0"/>
+            <a:endParaRPr lang="en-US" sz="6600" dirty="0">
+              <a:latin typeface="Trebuchet MS"/>
+              <a:cs typeface="Trebuchet MS"/>
+            </a:endParaRPr>
           </a:p>
         </p:txBody>
       </p:sp>
@@ -3701,18 +3804,30 @@
           <a:lstStyle/>
           <a:p>
             <a:r>
-              <a:rPr lang="en-US" sz="3600" b="1" dirty="0" smtClean="0"/>
+              <a:rPr lang="en-US" sz="3600" b="1" dirty="0" smtClean="0">
+                <a:latin typeface="Trebuchet MS"/>
+                <a:cs typeface="Trebuchet MS"/>
+              </a:rPr>
               <a:t>Example dataset: gut </a:t>
             </a:r>
             <a:r>
-              <a:rPr lang="en-US" sz="3600" b="1" dirty="0" err="1" smtClean="0"/>
+              <a:rPr lang="en-US" sz="3600" b="1" dirty="0" err="1" smtClean="0">
+                <a:latin typeface="Trebuchet MS"/>
+                <a:cs typeface="Trebuchet MS"/>
+              </a:rPr>
               <a:t>microbiota</a:t>
             </a:r>
             <a:r>
-              <a:rPr lang="en-US" sz="3600" b="1" dirty="0" smtClean="0"/>
+              <a:rPr lang="en-US" sz="3600" b="1" dirty="0" smtClean="0">
+                <a:latin typeface="Trebuchet MS"/>
+                <a:cs typeface="Trebuchet MS"/>
+              </a:rPr>
               <a:t> following antibiotic treatment</a:t>
             </a:r>
-            <a:endParaRPr lang="en-US" sz="3600" b="1" dirty="0"/>
+            <a:endParaRPr lang="en-US" sz="3600" b="1" dirty="0">
+              <a:latin typeface="Trebuchet MS"/>
+              <a:cs typeface="Trebuchet MS"/>
+            </a:endParaRPr>
           </a:p>
         </p:txBody>
       </p:sp>
@@ -3843,10 +3958,16 @@
           <a:lstStyle/>
           <a:p>
             <a:r>
-              <a:rPr lang="en-US" sz="4000" dirty="0" smtClean="0"/>
+              <a:rPr lang="en-US" sz="4000" dirty="0" smtClean="0">
+                <a:latin typeface="Trebuchet MS"/>
+                <a:cs typeface="Trebuchet MS"/>
+              </a:rPr>
               <a:t>Antibiotics</a:t>
             </a:r>
-            <a:endParaRPr lang="en-US" sz="4000" dirty="0"/>
+            <a:endParaRPr lang="en-US" sz="4000" dirty="0">
+              <a:latin typeface="Trebuchet MS"/>
+              <a:cs typeface="Trebuchet MS"/>
+            </a:endParaRPr>
           </a:p>
         </p:txBody>
       </p:sp>
@@ -3875,10 +3996,16 @@
           <a:lstStyle/>
           <a:p>
             <a:r>
-              <a:rPr lang="en-US" sz="4000" dirty="0" smtClean="0"/>
+              <a:rPr lang="en-US" sz="4000" dirty="0" smtClean="0">
+                <a:latin typeface="Trebuchet MS"/>
+                <a:cs typeface="Trebuchet MS"/>
+              </a:rPr>
               <a:t>Controls</a:t>
             </a:r>
-            <a:endParaRPr lang="en-US" sz="4000" dirty="0"/>
+            <a:endParaRPr lang="en-US" sz="4000" dirty="0">
+              <a:latin typeface="Trebuchet MS"/>
+              <a:cs typeface="Trebuchet MS"/>
+            </a:endParaRPr>
           </a:p>
         </p:txBody>
       </p:sp>
@@ -3906,10 +4033,16 @@
           <a:p>
             <a:pPr algn="ctr"/>
             <a:r>
-              <a:rPr lang="en-US" sz="3200" dirty="0" smtClean="0"/>
+              <a:rPr lang="en-US" sz="3200" dirty="0" smtClean="0">
+                <a:latin typeface="Trebuchet MS"/>
+                <a:cs typeface="Trebuchet MS"/>
+              </a:rPr>
               <a:t>Samples from 2 days and 6 weeks following</a:t>
             </a:r>
-            <a:endParaRPr lang="en-US" sz="3200" dirty="0"/>
+            <a:endParaRPr lang="en-US" sz="3200" dirty="0">
+              <a:latin typeface="Trebuchet MS"/>
+              <a:cs typeface="Trebuchet MS"/>
+            </a:endParaRPr>
           </a:p>
         </p:txBody>
       </p:sp>
@@ -3941,10 +4074,16 @@
           <a:lstStyle/>
           <a:p>
             <a:r>
-              <a:rPr lang="en-US" sz="3600" dirty="0" smtClean="0"/>
+              <a:rPr lang="en-US" sz="3600" dirty="0" smtClean="0">
+                <a:latin typeface="Trebuchet MS"/>
+                <a:cs typeface="Trebuchet MS"/>
+              </a:rPr>
               <a:t>References</a:t>
             </a:r>
-            <a:endParaRPr lang="en-US" sz="3600" dirty="0"/>
+            <a:endParaRPr lang="en-US" sz="3600" dirty="0">
+              <a:latin typeface="Trebuchet MS"/>
+              <a:cs typeface="Trebuchet MS"/>
+            </a:endParaRPr>
           </a:p>
         </p:txBody>
       </p:sp>
@@ -3971,57 +4110,96 @@
           <a:lstStyle/>
           <a:p>
             <a:r>
-              <a:rPr lang="en-US" sz="2000" dirty="0" err="1" smtClean="0"/>
+              <a:rPr lang="en-US" sz="2000" dirty="0" err="1" smtClean="0">
+                <a:latin typeface="Trebuchet MS"/>
+                <a:cs typeface="Trebuchet MS"/>
+              </a:rPr>
               <a:t>Theriot</a:t>
             </a:r>
             <a:r>
-              <a:rPr lang="en-US" sz="2000" dirty="0" smtClean="0"/>
+              <a:rPr lang="en-US" sz="2000" dirty="0" smtClean="0">
+                <a:latin typeface="Trebuchet MS"/>
+                <a:cs typeface="Trebuchet MS"/>
+              </a:rPr>
               <a:t> </a:t>
             </a:r>
             <a:r>
-              <a:rPr lang="en-US" sz="2000" dirty="0"/>
+              <a:rPr lang="en-US" sz="2000" dirty="0">
+                <a:latin typeface="Trebuchet MS"/>
+                <a:cs typeface="Trebuchet MS"/>
+              </a:rPr>
               <a:t>et al (2014) </a:t>
             </a:r>
             <a:r>
-              <a:rPr lang="en-US" sz="2000" i="1" dirty="0"/>
+              <a:rPr lang="en-US" sz="2000" i="1" dirty="0">
+                <a:latin typeface="Trebuchet MS"/>
+                <a:cs typeface="Trebuchet MS"/>
+              </a:rPr>
               <a:t>Nature Communications</a:t>
             </a:r>
           </a:p>
           <a:p>
             <a:r>
-              <a:rPr lang="en-US" sz="2000" dirty="0" smtClean="0"/>
+              <a:rPr lang="en-US" sz="2000" dirty="0" smtClean="0">
+                <a:latin typeface="Trebuchet MS"/>
+                <a:cs typeface="Trebuchet MS"/>
+              </a:rPr>
               <a:t>HMP Consortium (2012) </a:t>
             </a:r>
             <a:r>
-              <a:rPr lang="en-US" sz="2000" i="1" dirty="0" smtClean="0"/>
+              <a:rPr lang="en-US" sz="2000" i="1" dirty="0" smtClean="0">
+                <a:latin typeface="Trebuchet MS"/>
+                <a:cs typeface="Trebuchet MS"/>
+              </a:rPr>
               <a:t>Nature</a:t>
             </a:r>
           </a:p>
           <a:p>
             <a:r>
-              <a:rPr lang="en-US" sz="2000" dirty="0" err="1" smtClean="0"/>
+              <a:rPr lang="en-US" sz="2000" dirty="0" err="1" smtClean="0">
+                <a:latin typeface="Trebuchet MS"/>
+                <a:cs typeface="Trebuchet MS"/>
+              </a:rPr>
               <a:t>Treangen</a:t>
             </a:r>
             <a:r>
-              <a:rPr lang="en-US" sz="2000" dirty="0" smtClean="0"/>
+              <a:rPr lang="en-US" sz="2000" dirty="0" smtClean="0">
+                <a:latin typeface="Trebuchet MS"/>
+                <a:cs typeface="Trebuchet MS"/>
+              </a:rPr>
               <a:t> et al (2013) </a:t>
             </a:r>
             <a:r>
-              <a:rPr lang="en-US" sz="2000" i="1" dirty="0" smtClean="0"/>
+              <a:rPr lang="en-US" sz="2000" i="1" dirty="0" smtClean="0">
+                <a:latin typeface="Trebuchet MS"/>
+                <a:cs typeface="Trebuchet MS"/>
+              </a:rPr>
               <a:t>Genome Biology</a:t>
             </a:r>
-            <a:endParaRPr lang="en-US" sz="2000" dirty="0" smtClean="0"/>
-          </a:p>
-          <a:p>
-            <a:r>
-              <a:rPr lang="en-US" sz="2000" dirty="0"/>
+            <a:endParaRPr lang="en-US" sz="2000" dirty="0" smtClean="0">
+              <a:latin typeface="Trebuchet MS"/>
+              <a:cs typeface="Trebuchet MS"/>
+            </a:endParaRPr>
+          </a:p>
+          <a:p>
+            <a:r>
+              <a:rPr lang="en-US" sz="2000" dirty="0">
+                <a:latin typeface="Trebuchet MS"/>
+                <a:cs typeface="Trebuchet MS"/>
+              </a:rPr>
               <a:t>Manor et al (2015) in </a:t>
             </a:r>
             <a:r>
-              <a:rPr lang="en-US" sz="2000" dirty="0" smtClean="0"/>
+              <a:rPr lang="en-US" sz="2000" dirty="0" smtClean="0">
+                <a:latin typeface="Trebuchet MS"/>
+                <a:cs typeface="Trebuchet MS"/>
+              </a:rPr>
               <a:t>preparation</a:t>
             </a:r>
-            <a:endParaRPr lang="en-US" sz="2000" dirty="0"/>
+            <a:endParaRPr lang="en-US" sz="2000" dirty="0">
+              <a:latin typeface="Trebuchet MS"/>
+              <a:cs typeface="Trebuchet MS"/>
+            </a:endParaRPr>
           </a:p>
         </p:txBody>
       </p:sp>
@@ -4048,10 +4226,104 @@
           <a:lstStyle/>
           <a:p>
             <a:r>
-              <a:rPr lang="en-US" sz="3200" dirty="0" smtClean="0"/>
+              <a:rPr lang="en-US" sz="3200" dirty="0" smtClean="0">
+                <a:latin typeface="Trebuchet MS"/>
+                <a:cs typeface="Trebuchet MS"/>
+              </a:rPr>
               <a:t>will remake this schematic later</a:t>
             </a:r>
-            <a:endParaRPr lang="en-US" sz="3200" dirty="0"/>
+            <a:endParaRPr lang="en-US" sz="3200" dirty="0">
+              <a:latin typeface="Trebuchet MS"/>
+              <a:cs typeface="Trebuchet MS"/>
+            </a:endParaRPr>
+          </a:p>
+        </p:txBody>
+      </p:sp>
+      <p:sp>
+        <p:nvSpPr>
+          <p:cNvPr id="28" name="Rectangle 27"/>
+          <p:cNvSpPr/>
+          <p:nvPr/>
+        </p:nvSpPr>
+        <p:spPr>
+          <a:xfrm>
+            <a:off x="152400" y="7274319"/>
+            <a:ext cx="9712499" cy="1200329"/>
+          </a:xfrm>
+          <a:prstGeom prst="rect">
+            <a:avLst/>
+          </a:prstGeom>
+          <a:solidFill>
+            <a:schemeClr val="accent2">
+              <a:lumMod val="60000"/>
+              <a:lumOff val="40000"/>
+            </a:schemeClr>
+          </a:solidFill>
+        </p:spPr>
+        <p:txBody>
+          <a:bodyPr wrap="none" lIns="365760" tIns="91440" rIns="365760" bIns="91440">
+            <a:spAutoFit/>
+          </a:bodyPr>
+          <a:lstStyle/>
+          <a:p>
+            <a:r>
+              <a:rPr lang="en-US" sz="6600" dirty="0">
+                <a:latin typeface="Trebuchet MS"/>
+                <a:cs typeface="Trebuchet MS"/>
+              </a:rPr>
+              <a:t>Motivation and Problem</a:t>
+            </a:r>
+          </a:p>
+        </p:txBody>
+      </p:sp>
+      <p:sp>
+        <p:nvSpPr>
+          <p:cNvPr id="2" name="TextBox 1"/>
+          <p:cNvSpPr txBox="1"/>
+          <p:nvPr/>
+        </p:nvSpPr>
+        <p:spPr>
+          <a:xfrm>
+            <a:off x="360172" y="24020584"/>
+            <a:ext cx="6389226" cy="1323439"/>
+          </a:xfrm>
+          <a:prstGeom prst="rect">
+            <a:avLst/>
+          </a:prstGeom>
+          <a:solidFill>
+            <a:schemeClr val="accent2">
+              <a:lumMod val="60000"/>
+              <a:lumOff val="40000"/>
+            </a:schemeClr>
+          </a:solidFill>
+        </p:spPr>
+        <p:txBody>
+          <a:bodyPr wrap="square" rtlCol="0">
+            <a:spAutoFit/>
+          </a:bodyPr>
+          <a:lstStyle/>
+          <a:p>
+            <a:r>
+              <a:rPr lang="en-US" sz="4000" b="1" dirty="0" smtClean="0">
+                <a:cs typeface="Trebuchet MS"/>
+              </a:rPr>
+              <a:t> Challenges </a:t>
+            </a:r>
+            <a:r>
+              <a:rPr lang="en-US" sz="4000" b="1" dirty="0">
+                <a:cs typeface="Trebuchet MS"/>
+              </a:rPr>
+              <a:t>and Previous </a:t>
+            </a:r>
+            <a:r>
+              <a:rPr lang="en-US" sz="4000" b="1" dirty="0" smtClean="0">
+                <a:cs typeface="Trebuchet MS"/>
+              </a:rPr>
+              <a:t> Work:</a:t>
+            </a:r>
+            <a:endParaRPr lang="en-US" sz="4000" b="1" dirty="0">
+              <a:cs typeface="Trebuchet MS"/>
+            </a:endParaRPr>
           </a:p>
         </p:txBody>
       </p:sp>
@@ -4413,6 +4685,15 @@
 </file>
 
 <file path=customXml/item1.xml><?xml version="1.0" encoding="utf-8"?>
+<p:properties xmlns:p="http://schemas.microsoft.com/office/2006/metadata/properties" xmlns:xsi="http://www.w3.org/2001/XMLSchema-instance" xmlns:pc="http://schemas.microsoft.com/office/infopath/2007/PartnerControls">
+  <documentManagement>
+    <_Version xmlns="http://schemas.microsoft.com/sharepoint/v3/fields" xsi:nil="true"/>
+    <_Status xmlns="http://schemas.microsoft.com/sharepoint/v3/fields">Not Started</_Status>
+  </documentManagement>
+</p:properties>
+</file>
+
+<file path=customXml/item2.xml><?xml version="1.0" encoding="utf-8"?>
 <ct:contentTypeSchema xmlns:ct="http://schemas.microsoft.com/office/2006/metadata/contentType" xmlns:ma="http://schemas.microsoft.com/office/2006/metadata/properties/metaAttributes" ct:_="" ma:_="" ma:contentTypeName="Document" ma:contentTypeID="0x0101000DE64AEEDD9B7A4D93545ACBE97D4615" ma:contentTypeVersion="2" ma:contentTypeDescription="Create a new document." ma:contentTypeScope="" ma:versionID="f49002b78e3a4a71b814eef46a983816">
   <xsd:schema xmlns:xsd="http://www.w3.org/2001/XMLSchema" xmlns:xs="http://www.w3.org/2001/XMLSchema" xmlns:p="http://schemas.microsoft.com/office/2006/metadata/properties" xmlns:ns2="http://schemas.microsoft.com/sharepoint/v3/fields" targetNamespace="http://schemas.microsoft.com/office/2006/metadata/properties" ma:root="true" ma:fieldsID="38f6db2dd0d9a0cf6a8dc37be32b365b" ns2:_="">
     <xsd:import namespace="http://schemas.microsoft.com/sharepoint/v3/fields"/>
@@ -4556,7 +4837,7 @@
 </ct:contentTypeSchema>
 </file>
 
-<file path=customXml/item2.xml><?xml version="1.0" encoding="utf-8"?>
+<file path=customXml/item3.xml><?xml version="1.0" encoding="utf-8"?>
 <?mso-contentType ?>
 <FormTemplates xmlns="http://schemas.microsoft.com/sharepoint/v3/contenttype/forms">
   <Display>DocumentLibraryForm</Display>
@@ -4565,16 +4846,17 @@
 </FormTemplates>
 </file>
 
-<file path=customXml/item3.xml><?xml version="1.0" encoding="utf-8"?>
-<p:properties xmlns:p="http://schemas.microsoft.com/office/2006/metadata/properties" xmlns:xsi="http://www.w3.org/2001/XMLSchema-instance" xmlns:pc="http://schemas.microsoft.com/office/infopath/2007/PartnerControls">
-  <documentManagement>
-    <_Version xmlns="http://schemas.microsoft.com/sharepoint/v3/fields" xsi:nil="true"/>
-    <_Status xmlns="http://schemas.microsoft.com/sharepoint/v3/fields">Not Started</_Status>
-  </documentManagement>
-</p:properties>
+<file path=customXml/itemProps1.xml><?xml version="1.0" encoding="utf-8"?>
+<ds:datastoreItem xmlns:ds="http://schemas.openxmlformats.org/officeDocument/2006/customXml" ds:itemID="{7B6F2769-7194-4217-93D3-3AF3A4742282}">
+  <ds:schemaRefs>
+    <ds:schemaRef ds:uri="http://schemas.microsoft.com/office/2006/metadata/properties"/>
+    <ds:schemaRef ds:uri="http://schemas.microsoft.com/office/infopath/2007/PartnerControls"/>
+    <ds:schemaRef ds:uri="http://schemas.microsoft.com/sharepoint/v3/fields"/>
+  </ds:schemaRefs>
+</ds:datastoreItem>
 </file>
 
-<file path=customXml/itemProps1.xml><?xml version="1.0" encoding="utf-8"?>
+<file path=customXml/itemProps2.xml><?xml version="1.0" encoding="utf-8"?>
 <ds:datastoreItem xmlns:ds="http://schemas.openxmlformats.org/officeDocument/2006/customXml" ds:itemID="{E4214858-785C-42F7-BE66-6D0E79395FC8}">
   <ds:schemaRefs>
     <ds:schemaRef ds:uri="http://schemas.microsoft.com/office/2006/metadata/contentType"/>
@@ -4592,20 +4874,10 @@
 </ds:datastoreItem>
 </file>
 
-<file path=customXml/itemProps2.xml><?xml version="1.0" encoding="utf-8"?>
+<file path=customXml/itemProps3.xml><?xml version="1.0" encoding="utf-8"?>
 <ds:datastoreItem xmlns:ds="http://schemas.openxmlformats.org/officeDocument/2006/customXml" ds:itemID="{87D2A1B0-FF3E-4009-940D-AED0EB70AA20}">
   <ds:schemaRefs>
     <ds:schemaRef ds:uri="http://schemas.microsoft.com/sharepoint/v3/contenttype/forms"/>
   </ds:schemaRefs>
 </ds:datastoreItem>
-</file>
-
-<file path=customXml/itemProps3.xml><?xml version="1.0" encoding="utf-8"?>
-<ds:datastoreItem xmlns:ds="http://schemas.openxmlformats.org/officeDocument/2006/customXml" ds:itemID="{7B6F2769-7194-4217-93D3-3AF3A4742282}">
-  <ds:schemaRefs>
-    <ds:schemaRef ds:uri="http://schemas.microsoft.com/office/2006/metadata/properties"/>
-    <ds:schemaRef ds:uri="http://schemas.microsoft.com/office/infopath/2007/PartnerControls"/>
-    <ds:schemaRef ds:uri="http://schemas.microsoft.com/sharepoint/v3/fields"/>
-  </ds:schemaRefs>
-</ds:datastoreItem>
 </file>
</xml_diff>

<commit_message>
added images to poster
</commit_message>
<xml_diff>
--- a/poster1.pptx
+++ b/poster1.pptx
@@ -3107,22 +3107,190 @@
       </p:grpSpPr>
       <p:sp>
         <p:nvSpPr>
+          <p:cNvPr id="8" name="TextBox 7"/>
+          <p:cNvSpPr txBox="1"/>
+          <p:nvPr/>
+        </p:nvSpPr>
+        <p:spPr>
+          <a:xfrm>
+            <a:off x="476212" y="7793380"/>
+            <a:ext cx="9087784" cy="15511941"/>
+          </a:xfrm>
+          <a:prstGeom prst="rect">
+            <a:avLst/>
+          </a:prstGeom>
+          <a:noFill/>
+        </p:spPr>
+        <p:txBody>
+          <a:bodyPr wrap="square" rtlCol="0">
+            <a:spAutoFit/>
+          </a:bodyPr>
+          <a:lstStyle/>
+          <a:p>
+            <a:pPr>
+              <a:lnSpc>
+                <a:spcPct val="120000"/>
+              </a:lnSpc>
+            </a:pPr>
+            <a:r>
+              <a:rPr lang="en-US" sz="3200" dirty="0" smtClean="0"/>
+              <a:t>New technologies enable detailed profiling of the taxonomic and functional composition of microbial communities and the variation in these across different environments.</a:t>
+            </a:r>
+          </a:p>
+          <a:p>
+            <a:pPr marL="857250" indent="-857250">
+              <a:lnSpc>
+                <a:spcPct val="120000"/>
+              </a:lnSpc>
+              <a:buFont typeface="Arial"/>
+              <a:buChar char="•"/>
+            </a:pPr>
+            <a:endParaRPr lang="en-US" sz="4000" dirty="0" smtClean="0"/>
+          </a:p>
+          <a:p>
+            <a:pPr marL="857250" indent="-857250">
+              <a:lnSpc>
+                <a:spcPct val="120000"/>
+              </a:lnSpc>
+              <a:buFont typeface="Arial"/>
+              <a:buChar char="•"/>
+            </a:pPr>
+            <a:endParaRPr lang="en-US" sz="4000" dirty="0" smtClean="0"/>
+          </a:p>
+          <a:p>
+            <a:pPr marL="857250" indent="-857250">
+              <a:lnSpc>
+                <a:spcPct val="120000"/>
+              </a:lnSpc>
+              <a:buFont typeface="Arial"/>
+              <a:buChar char="•"/>
+            </a:pPr>
+            <a:endParaRPr lang="en-US" sz="4000" dirty="0" smtClean="0"/>
+          </a:p>
+          <a:p>
+            <a:pPr marL="857250" indent="-857250">
+              <a:lnSpc>
+                <a:spcPct val="120000"/>
+              </a:lnSpc>
+              <a:buFont typeface="Arial"/>
+              <a:buChar char="•"/>
+            </a:pPr>
+            <a:endParaRPr lang="en-US" sz="4000" dirty="0" smtClean="0"/>
+          </a:p>
+          <a:p>
+            <a:pPr marL="857250" indent="-857250">
+              <a:lnSpc>
+                <a:spcPct val="120000"/>
+              </a:lnSpc>
+              <a:buFont typeface="Arial"/>
+              <a:buChar char="•"/>
+            </a:pPr>
+            <a:endParaRPr lang="en-US" sz="4000" dirty="0" smtClean="0"/>
+          </a:p>
+          <a:p>
+            <a:pPr marL="857250" indent="-857250">
+              <a:lnSpc>
+                <a:spcPct val="120000"/>
+              </a:lnSpc>
+              <a:buFont typeface="Arial"/>
+              <a:buChar char="•"/>
+            </a:pPr>
+            <a:endParaRPr lang="en-US" sz="4000" dirty="0" smtClean="0"/>
+          </a:p>
+          <a:p>
+            <a:pPr>
+              <a:lnSpc>
+                <a:spcPct val="120000"/>
+              </a:lnSpc>
+            </a:pPr>
+            <a:r>
+              <a:rPr lang="en-US" sz="3600" b="1" dirty="0" smtClean="0"/>
+              <a:t>Typical questions to ask about these datasets:</a:t>
+            </a:r>
+          </a:p>
+          <a:p>
+            <a:pPr marL="1190625" lvl="1" indent="-674688">
+              <a:lnSpc>
+                <a:spcPct val="120000"/>
+              </a:lnSpc>
+              <a:buFont typeface="Arial"/>
+              <a:buChar char="•"/>
+            </a:pPr>
+            <a:r>
+              <a:rPr lang="en-US" sz="3600" dirty="0" smtClean="0"/>
+              <a:t>What are the functional differences across samples?</a:t>
+            </a:r>
+          </a:p>
+          <a:p>
+            <a:pPr marL="1190625" lvl="1" indent="-674688">
+              <a:lnSpc>
+                <a:spcPct val="120000"/>
+              </a:lnSpc>
+              <a:buFont typeface="Arial"/>
+              <a:buChar char="•"/>
+            </a:pPr>
+            <a:r>
+              <a:rPr lang="en-US" sz="3600" dirty="0" smtClean="0"/>
+              <a:t>What taxonomic variation accounts for those differences?</a:t>
+            </a:r>
+          </a:p>
+          <a:p>
+            <a:pPr marL="1190625" lvl="1" indent="-674688">
+              <a:lnSpc>
+                <a:spcPct val="120000"/>
+              </a:lnSpc>
+              <a:buFont typeface="Arial"/>
+              <a:buChar char="•"/>
+            </a:pPr>
+            <a:r>
+              <a:rPr lang="en-US" sz="3600" dirty="0" smtClean="0"/>
+              <a:t>Are taxa or functions more variable?</a:t>
+            </a:r>
+          </a:p>
+          <a:p>
+            <a:pPr marL="1190625" lvl="1" indent="-674688">
+              <a:lnSpc>
+                <a:spcPct val="120000"/>
+              </a:lnSpc>
+              <a:buFont typeface="Arial"/>
+              <a:buChar char="•"/>
+            </a:pPr>
+            <a:r>
+              <a:rPr lang="en-US" sz="3600" dirty="0" smtClean="0"/>
+              <a:t>Are particular taxa or functions associated with different study groups?</a:t>
+            </a:r>
+          </a:p>
+          <a:p>
+            <a:pPr>
+              <a:lnSpc>
+                <a:spcPct val="120000"/>
+              </a:lnSpc>
+            </a:pPr>
+            <a:r>
+              <a:rPr lang="en-US" sz="3600" b="1" dirty="0" smtClean="0"/>
+              <a:t>Our tool allows researchers to upload a dataset and interactively explore these questions.</a:t>
+            </a:r>
+          </a:p>
+        </p:txBody>
+      </p:sp>
+      <p:sp>
+        <p:nvSpPr>
           <p:cNvPr id="4" name="TextBox 3"/>
           <p:cNvSpPr txBox="1"/>
           <p:nvPr/>
         </p:nvSpPr>
         <p:spPr>
           <a:xfrm>
-            <a:off x="6107629" y="0"/>
-            <a:ext cx="15837971" cy="5293757"/>
+            <a:off x="6198360" y="0"/>
+            <a:ext cx="15837971" cy="4944943"/>
           </a:xfrm>
           <a:prstGeom prst="rect">
             <a:avLst/>
           </a:prstGeom>
           <a:solidFill>
             <a:schemeClr val="accent4">
-              <a:lumMod val="20000"/>
-              <a:lumOff val="80000"/>
+              <a:lumMod val="60000"/>
+              <a:lumOff val="40000"/>
             </a:schemeClr>
           </a:solidFill>
         </p:spPr>
@@ -3134,34 +3302,22 @@
           <a:p>
             <a:pPr algn="ctr">
               <a:lnSpc>
-                <a:spcPct val="130000"/>
+                <a:spcPct val="120000"/>
               </a:lnSpc>
             </a:pPr>
             <a:r>
-              <a:rPr lang="en-US" sz="8000" dirty="0" smtClean="0">
-                <a:latin typeface="Trebuchet MS"/>
-                <a:cs typeface="Trebuchet MS"/>
-              </a:rPr>
+              <a:rPr lang="en-US" sz="8000" dirty="0" smtClean="0"/>
               <a:t>Exploratory data analysis of taxonomic and functional </a:t>
             </a:r>
             <a:r>
-              <a:rPr lang="en-US" sz="8000" dirty="0" err="1" smtClean="0">
-                <a:latin typeface="Trebuchet MS"/>
-                <a:cs typeface="Trebuchet MS"/>
-              </a:rPr>
+              <a:rPr lang="en-US" sz="8000" dirty="0" err="1" smtClean="0"/>
               <a:t>metagenomic</a:t>
             </a:r>
             <a:r>
-              <a:rPr lang="en-US" sz="8000" dirty="0" smtClean="0">
-                <a:latin typeface="Trebuchet MS"/>
-                <a:cs typeface="Trebuchet MS"/>
-              </a:rPr>
+              <a:rPr lang="en-US" sz="8000" dirty="0" smtClean="0"/>
               <a:t> data</a:t>
             </a:r>
-            <a:endParaRPr lang="en-US" sz="8000" dirty="0">
-              <a:latin typeface="Trebuchet MS"/>
-              <a:cs typeface="Trebuchet MS"/>
-            </a:endParaRPr>
+            <a:endParaRPr lang="en-US" sz="8000" dirty="0"/>
           </a:p>
         </p:txBody>
       </p:sp>
@@ -3181,8 +3337,8 @@
         </p:blipFill>
         <p:spPr>
           <a:xfrm>
-            <a:off x="0" y="0"/>
-            <a:ext cx="6107629" cy="4071752"/>
+            <a:off x="0" y="-1"/>
+            <a:ext cx="6643377" cy="4428917"/>
           </a:xfrm>
           <a:prstGeom prst="rect">
             <a:avLst/>
@@ -3197,14 +3353,14 @@
         </p:nvSpPr>
         <p:spPr>
           <a:xfrm>
-            <a:off x="0" y="4071752"/>
-            <a:ext cx="8340615" cy="3046988"/>
+            <a:off x="1" y="4428917"/>
+            <a:ext cx="9712498" cy="2031325"/>
           </a:xfrm>
           <a:prstGeom prst="rect">
             <a:avLst/>
           </a:prstGeom>
           <a:solidFill>
-            <a:schemeClr val="accent1">
+            <a:schemeClr val="accent2">
               <a:lumMod val="40000"/>
               <a:lumOff val="60000"/>
             </a:schemeClr>
@@ -3217,224 +3373,18 @@
           <a:lstStyle/>
           <a:p>
             <a:r>
-              <a:rPr lang="en-US" sz="5400" dirty="0" smtClean="0">
-                <a:latin typeface="Trebuchet MS"/>
-                <a:cs typeface="Trebuchet MS"/>
-              </a:rPr>
+              <a:rPr lang="en-US" sz="4800" dirty="0" smtClean="0"/>
               <a:t>Alex </a:t>
             </a:r>
             <a:r>
-              <a:rPr lang="en-US" sz="5400" dirty="0" err="1" smtClean="0">
-                <a:latin typeface="Trebuchet MS"/>
-                <a:cs typeface="Trebuchet MS"/>
-              </a:rPr>
+              <a:rPr lang="en-US" sz="4800" dirty="0" err="1" smtClean="0"/>
               <a:t>Eng</a:t>
             </a:r>
             <a:r>
-              <a:rPr lang="en-US" sz="5400" dirty="0" smtClean="0">
-                <a:latin typeface="Trebuchet MS"/>
-                <a:cs typeface="Trebuchet MS"/>
-              </a:rPr>
+              <a:rPr lang="en-US" sz="4800" dirty="0" smtClean="0"/>
               <a:t>, Will Gagne-Maynard, Colin McNally, Cecilia Noecker</a:t>
             </a:r>
-            <a:endParaRPr lang="en-US" sz="5400" dirty="0">
-              <a:latin typeface="Trebuchet MS"/>
-              <a:cs typeface="Trebuchet MS"/>
-            </a:endParaRPr>
-          </a:p>
-        </p:txBody>
-      </p:sp>
-      <p:sp>
-        <p:nvSpPr>
-          <p:cNvPr id="8" name="TextBox 7"/>
-          <p:cNvSpPr txBox="1"/>
-          <p:nvPr/>
-        </p:nvSpPr>
-        <p:spPr>
-          <a:xfrm>
-            <a:off x="476212" y="8287044"/>
-            <a:ext cx="9087784" cy="15733540"/>
-          </a:xfrm>
-          <a:prstGeom prst="rect">
-            <a:avLst/>
-          </a:prstGeom>
-          <a:noFill/>
-        </p:spPr>
-        <p:txBody>
-          <a:bodyPr wrap="square" rtlCol="0">
-            <a:spAutoFit/>
-          </a:bodyPr>
-          <a:lstStyle/>
-          <a:p>
-            <a:pPr>
-              <a:lnSpc>
-                <a:spcPct val="120000"/>
-              </a:lnSpc>
-            </a:pPr>
-            <a:r>
-              <a:rPr lang="en-US" sz="3600" dirty="0" smtClean="0">
-                <a:latin typeface="Trebuchet MS"/>
-                <a:cs typeface="Trebuchet MS"/>
-              </a:rPr>
-              <a:t>New technologies enable detailed profiling of the taxonomic and functional composition of microbial communities and the variation in these across different environments.</a:t>
-            </a:r>
-          </a:p>
-          <a:p>
-            <a:pPr marL="857250" indent="-857250">
-              <a:lnSpc>
-                <a:spcPct val="120000"/>
-              </a:lnSpc>
-              <a:buFont typeface="Arial"/>
-              <a:buChar char="•"/>
-            </a:pPr>
-            <a:endParaRPr lang="en-US" sz="4000" dirty="0">
-              <a:latin typeface="Trebuchet MS"/>
-              <a:cs typeface="Trebuchet MS"/>
-            </a:endParaRPr>
-          </a:p>
-          <a:p>
-            <a:pPr marL="857250" indent="-857250">
-              <a:lnSpc>
-                <a:spcPct val="120000"/>
-              </a:lnSpc>
-              <a:buFont typeface="Arial"/>
-              <a:buChar char="•"/>
-            </a:pPr>
-            <a:endParaRPr lang="en-US" sz="4000" dirty="0" smtClean="0">
-              <a:latin typeface="Trebuchet MS"/>
-              <a:cs typeface="Trebuchet MS"/>
-            </a:endParaRPr>
-          </a:p>
-          <a:p>
-            <a:pPr marL="857250" indent="-857250">
-              <a:lnSpc>
-                <a:spcPct val="120000"/>
-              </a:lnSpc>
-              <a:buFont typeface="Arial"/>
-              <a:buChar char="•"/>
-            </a:pPr>
-            <a:endParaRPr lang="en-US" sz="4000" dirty="0">
-              <a:latin typeface="Trebuchet MS"/>
-              <a:cs typeface="Trebuchet MS"/>
-            </a:endParaRPr>
-          </a:p>
-          <a:p>
-            <a:pPr marL="857250" indent="-857250">
-              <a:lnSpc>
-                <a:spcPct val="120000"/>
-              </a:lnSpc>
-              <a:buFont typeface="Arial"/>
-              <a:buChar char="•"/>
-            </a:pPr>
-            <a:endParaRPr lang="en-US" sz="4000" dirty="0" smtClean="0">
-              <a:latin typeface="Trebuchet MS"/>
-              <a:cs typeface="Trebuchet MS"/>
-            </a:endParaRPr>
-          </a:p>
-          <a:p>
-            <a:pPr marL="857250" indent="-857250">
-              <a:lnSpc>
-                <a:spcPct val="120000"/>
-              </a:lnSpc>
-              <a:buFont typeface="Arial"/>
-              <a:buChar char="•"/>
-            </a:pPr>
-            <a:endParaRPr lang="en-US" sz="4000" dirty="0">
-              <a:latin typeface="Trebuchet MS"/>
-              <a:cs typeface="Trebuchet MS"/>
-            </a:endParaRPr>
-          </a:p>
-          <a:p>
-            <a:pPr>
-              <a:lnSpc>
-                <a:spcPct val="120000"/>
-              </a:lnSpc>
-            </a:pPr>
-            <a:r>
-              <a:rPr lang="en-US" sz="3600" b="1" dirty="0" smtClean="0">
-                <a:latin typeface="Trebuchet MS"/>
-                <a:cs typeface="Trebuchet MS"/>
-              </a:rPr>
-              <a:t>Typical questions to ask about these datasets:</a:t>
-            </a:r>
-          </a:p>
-          <a:p>
-            <a:pPr marL="1190625" lvl="1" indent="-674688">
-              <a:lnSpc>
-                <a:spcPct val="120000"/>
-              </a:lnSpc>
-              <a:buFont typeface="Arial"/>
-              <a:buChar char="•"/>
-            </a:pPr>
-            <a:r>
-              <a:rPr lang="en-US" sz="3600" dirty="0" smtClean="0">
-                <a:latin typeface="Trebuchet MS"/>
-                <a:cs typeface="Trebuchet MS"/>
-              </a:rPr>
-              <a:t>What are the functional differences across samples?</a:t>
-            </a:r>
-          </a:p>
-          <a:p>
-            <a:pPr marL="1190625" lvl="1" indent="-674688">
-              <a:lnSpc>
-                <a:spcPct val="120000"/>
-              </a:lnSpc>
-              <a:buFont typeface="Arial"/>
-              <a:buChar char="•"/>
-            </a:pPr>
-            <a:r>
-              <a:rPr lang="en-US" sz="3600" dirty="0" smtClean="0">
-                <a:latin typeface="Trebuchet MS"/>
-                <a:cs typeface="Trebuchet MS"/>
-              </a:rPr>
-              <a:t>What taxonomic variation accounts for those differences?</a:t>
-            </a:r>
-          </a:p>
-          <a:p>
-            <a:pPr marL="1190625" lvl="1" indent="-674688">
-              <a:lnSpc>
-                <a:spcPct val="120000"/>
-              </a:lnSpc>
-              <a:buFont typeface="Arial"/>
-              <a:buChar char="•"/>
-            </a:pPr>
-            <a:r>
-              <a:rPr lang="en-US" sz="3600" dirty="0" smtClean="0">
-                <a:latin typeface="Trebuchet MS"/>
-                <a:cs typeface="Trebuchet MS"/>
-              </a:rPr>
-              <a:t>Are taxa or functions more variable?</a:t>
-            </a:r>
-          </a:p>
-          <a:p>
-            <a:pPr marL="1190625" lvl="1" indent="-674688">
-              <a:lnSpc>
-                <a:spcPct val="120000"/>
-              </a:lnSpc>
-              <a:buFont typeface="Arial"/>
-              <a:buChar char="•"/>
-            </a:pPr>
-            <a:r>
-              <a:rPr lang="en-US" sz="3600" dirty="0" smtClean="0">
-                <a:latin typeface="Trebuchet MS"/>
-                <a:cs typeface="Trebuchet MS"/>
-              </a:rPr>
-              <a:t>Are particular taxa or functions associated with different study groups?</a:t>
-            </a:r>
-          </a:p>
-          <a:p>
-            <a:pPr>
-              <a:lnSpc>
-                <a:spcPct val="120000"/>
-              </a:lnSpc>
-            </a:pPr>
-            <a:r>
-              <a:rPr lang="en-US" sz="3600" b="1" dirty="0" smtClean="0">
-                <a:latin typeface="Trebuchet MS"/>
-                <a:cs typeface="Trebuchet MS"/>
-              </a:rPr>
-              <a:t>Our tool allows researchers to upload a dataset and interactively explore these questions.</a:t>
-            </a:r>
+            <a:endParaRPr lang="en-US" sz="4800" dirty="0"/>
           </a:p>
         </p:txBody>
       </p:sp>
@@ -3454,13 +3404,13 @@
               </a:ext>
             </a:extLst>
           </a:blip>
-          <a:srcRect l="3941" t="22767" r="7197"/>
+          <a:srcRect l="35186" t="29491" r="39613" b="37130"/>
           <a:stretch/>
         </p:blipFill>
         <p:spPr>
           <a:xfrm>
-            <a:off x="1340814" y="11587914"/>
-            <a:ext cx="5363316" cy="3496141"/>
+            <a:off x="11507978" y="9645537"/>
+            <a:ext cx="1899044" cy="1886422"/>
           </a:xfrm>
           <a:prstGeom prst="rect">
             <a:avLst/>
@@ -3475,7 +3425,7 @@
         </p:nvSpPr>
         <p:spPr>
           <a:xfrm>
-            <a:off x="360172" y="25386697"/>
+            <a:off x="329123" y="25138545"/>
             <a:ext cx="6505266" cy="6721842"/>
           </a:xfrm>
           <a:prstGeom prst="rect">
@@ -3496,17 +3446,11 @@
               <a:buChar char="•"/>
             </a:pPr>
             <a:r>
-              <a:rPr lang="en-US" sz="3600" dirty="0" smtClean="0">
-                <a:latin typeface="Trebuchet MS"/>
-                <a:cs typeface="Trebuchet MS"/>
-              </a:rPr>
+              <a:rPr lang="en-US" sz="3600" dirty="0" smtClean="0"/>
               <a:t>Compositional </a:t>
             </a:r>
             <a:r>
-              <a:rPr lang="en-US" sz="3600" dirty="0" smtClean="0">
-                <a:latin typeface="Trebuchet MS"/>
-                <a:cs typeface="Trebuchet MS"/>
-              </a:rPr>
+              <a:rPr lang="en-US" sz="3600" dirty="0" smtClean="0"/>
               <a:t>data</a:t>
             </a:r>
           </a:p>
@@ -3517,10 +3461,7 @@
               </a:lnSpc>
             </a:pPr>
             <a:r>
-              <a:rPr lang="en-US" sz="3600" dirty="0" smtClean="0">
-                <a:latin typeface="Trebuchet MS"/>
-                <a:cs typeface="Trebuchet MS"/>
-              </a:rPr>
+              <a:rPr lang="en-US" sz="3600" dirty="0" smtClean="0"/>
               <a:t>Stacked bar plots are standard visualization</a:t>
             </a:r>
           </a:p>
@@ -3533,17 +3474,11 @@
               <a:buChar char="•"/>
             </a:pPr>
             <a:r>
-              <a:rPr lang="en-US" sz="3600" dirty="0" smtClean="0">
-                <a:latin typeface="Trebuchet MS"/>
-                <a:cs typeface="Trebuchet MS"/>
-              </a:rPr>
+              <a:rPr lang="en-US" sz="3600" dirty="0" smtClean="0"/>
               <a:t>Summarizing </a:t>
             </a:r>
             <a:r>
-              <a:rPr lang="en-US" sz="3600" dirty="0">
-                <a:latin typeface="Trebuchet MS"/>
-                <a:cs typeface="Trebuchet MS"/>
-              </a:rPr>
+              <a:rPr lang="en-US" sz="3600" dirty="0"/>
               <a:t>by hierarchies of taxa and functions</a:t>
             </a:r>
           </a:p>
@@ -3554,23 +3489,14 @@
               </a:lnSpc>
             </a:pPr>
             <a:r>
-              <a:rPr lang="en-US" sz="3600" dirty="0">
-                <a:latin typeface="Trebuchet MS"/>
-                <a:cs typeface="Trebuchet MS"/>
-              </a:rPr>
+              <a:rPr lang="en-US" sz="3600" dirty="0"/>
               <a:t>Previous example: Krona </a:t>
             </a:r>
             <a:r>
-              <a:rPr lang="en-US" sz="3600" dirty="0" smtClean="0">
-                <a:latin typeface="Trebuchet MS"/>
-                <a:cs typeface="Trebuchet MS"/>
-              </a:rPr>
+              <a:rPr lang="en-US" sz="3600" dirty="0" smtClean="0"/>
               <a:t>plots</a:t>
             </a:r>
-            <a:endParaRPr lang="en-US" sz="3600" dirty="0">
-              <a:latin typeface="Trebuchet MS"/>
-              <a:cs typeface="Trebuchet MS"/>
-            </a:endParaRPr>
+            <a:endParaRPr lang="en-US" sz="3600" dirty="0"/>
           </a:p>
           <a:p>
             <a:pPr marL="571500" indent="-571500">
@@ -3581,10 +3507,7 @@
               <a:buChar char="•"/>
             </a:pPr>
             <a:r>
-              <a:rPr lang="en-US" sz="3600" dirty="0">
-                <a:latin typeface="Trebuchet MS"/>
-                <a:cs typeface="Trebuchet MS"/>
-              </a:rPr>
+              <a:rPr lang="en-US" sz="3600" dirty="0"/>
               <a:t>Complex relationships between taxa and functions</a:t>
             </a:r>
           </a:p>
@@ -3595,38 +3518,23 @@
               </a:lnSpc>
             </a:pPr>
             <a:r>
-              <a:rPr lang="en-US" sz="3600" dirty="0">
-                <a:latin typeface="Trebuchet MS"/>
-                <a:cs typeface="Trebuchet MS"/>
-              </a:rPr>
+              <a:rPr lang="en-US" sz="3600" dirty="0"/>
               <a:t>Previous example: </a:t>
             </a:r>
             <a:r>
-              <a:rPr lang="en-US" sz="3600" dirty="0" err="1" smtClean="0">
-                <a:latin typeface="Trebuchet MS"/>
-                <a:cs typeface="Trebuchet MS"/>
-              </a:rPr>
+              <a:rPr lang="en-US" sz="3600" dirty="0" err="1" smtClean="0"/>
               <a:t>FiShTaCo</a:t>
             </a:r>
             <a:r>
-              <a:rPr lang="en-US" sz="3600" dirty="0" smtClean="0">
-                <a:latin typeface="Trebuchet MS"/>
-                <a:cs typeface="Trebuchet MS"/>
-              </a:rPr>
+              <a:rPr lang="en-US" sz="3600" dirty="0" smtClean="0"/>
               <a:t> </a:t>
             </a:r>
             <a:r>
-              <a:rPr lang="en-US" sz="3600" dirty="0">
-                <a:latin typeface="Trebuchet MS"/>
-                <a:cs typeface="Trebuchet MS"/>
-              </a:rPr>
+              <a:rPr lang="en-US" sz="3600" dirty="0"/>
               <a:t>differential </a:t>
             </a:r>
             <a:r>
-              <a:rPr lang="en-US" sz="3600" dirty="0" smtClean="0">
-                <a:latin typeface="Trebuchet MS"/>
-                <a:cs typeface="Trebuchet MS"/>
-              </a:rPr>
+              <a:rPr lang="en-US" sz="3600" dirty="0" smtClean="0"/>
               <a:t>contributions</a:t>
             </a:r>
           </a:p>
@@ -3647,8 +3555,8 @@
         </p:blipFill>
         <p:spPr>
           <a:xfrm>
-            <a:off x="7353975" y="26442175"/>
-            <a:ext cx="2884659" cy="3231153"/>
+            <a:off x="7157301" y="26271584"/>
+            <a:ext cx="2753522" cy="3084264"/>
           </a:xfrm>
           <a:prstGeom prst="rect">
             <a:avLst/>
@@ -3671,8 +3579,8 @@
         </p:blipFill>
         <p:spPr>
           <a:xfrm>
-            <a:off x="6865437" y="29412416"/>
-            <a:ext cx="5068684" cy="3347244"/>
+            <a:off x="6834389" y="29190185"/>
+            <a:ext cx="4673589" cy="3086332"/>
           </a:xfrm>
           <a:prstGeom prst="rect">
             <a:avLst/>
@@ -3687,14 +3595,14 @@
         </p:nvSpPr>
         <p:spPr>
           <a:xfrm>
-            <a:off x="0" y="7121919"/>
+            <a:off x="0" y="6399243"/>
             <a:ext cx="9712499" cy="1200329"/>
           </a:xfrm>
           <a:prstGeom prst="rect">
             <a:avLst/>
           </a:prstGeom>
           <a:solidFill>
-            <a:schemeClr val="accent2">
+            <a:schemeClr val="accent3">
               <a:lumMod val="60000"/>
               <a:lumOff val="40000"/>
             </a:schemeClr>
@@ -3707,10 +3615,7 @@
           <a:lstStyle/>
           <a:p>
             <a:r>
-              <a:rPr lang="en-US" sz="6600" dirty="0">
-                <a:latin typeface="Trebuchet MS"/>
-                <a:cs typeface="Trebuchet MS"/>
-              </a:rPr>
+              <a:rPr lang="en-US" sz="6600" dirty="0"/>
               <a:t>Motivation and Problem</a:t>
             </a:r>
           </a:p>
@@ -3726,13 +3631,13 @@
         </p:nvPicPr>
         <p:blipFill rotWithShape="1">
           <a:blip r:embed="rId6"/>
-          <a:srcRect r="23322"/>
+          <a:srcRect r="28994"/>
           <a:stretch/>
         </p:blipFill>
         <p:spPr>
           <a:xfrm>
-            <a:off x="7148821" y="24020584"/>
-            <a:ext cx="4334829" cy="2409959"/>
+            <a:off x="6905304" y="23861625"/>
+            <a:ext cx="4014180" cy="2409959"/>
           </a:xfrm>
           <a:prstGeom prst="rect">
             <a:avLst/>
@@ -3747,14 +3652,14 @@
         </p:nvSpPr>
         <p:spPr>
           <a:xfrm>
-            <a:off x="10840113" y="5308865"/>
-            <a:ext cx="10626715" cy="1200329"/>
+            <a:off x="10833333" y="4946001"/>
+            <a:ext cx="10477307" cy="1200329"/>
           </a:xfrm>
           <a:prstGeom prst="rect">
             <a:avLst/>
           </a:prstGeom>
           <a:solidFill>
-            <a:schemeClr val="accent2">
+            <a:schemeClr val="accent3">
               <a:lumMod val="60000"/>
               <a:lumOff val="40000"/>
             </a:schemeClr>
@@ -3768,16 +3673,10 @@
           <a:p>
             <a:pPr algn="ctr"/>
             <a:r>
-              <a:rPr lang="en-US" sz="6600" dirty="0" smtClean="0">
-                <a:latin typeface="Trebuchet MS"/>
-                <a:cs typeface="Trebuchet MS"/>
-              </a:rPr>
+              <a:rPr lang="en-US" sz="6600" dirty="0" smtClean="0"/>
               <a:t>Approach and Results</a:t>
             </a:r>
-            <a:endParaRPr lang="en-US" sz="6600" dirty="0">
-              <a:latin typeface="Trebuchet MS"/>
-              <a:cs typeface="Trebuchet MS"/>
-            </a:endParaRPr>
+            <a:endParaRPr lang="en-US" sz="6600" dirty="0"/>
           </a:p>
         </p:txBody>
       </p:sp>
@@ -3804,30 +3703,18 @@
           <a:lstStyle/>
           <a:p>
             <a:r>
-              <a:rPr lang="en-US" sz="3600" b="1" dirty="0" smtClean="0">
-                <a:latin typeface="Trebuchet MS"/>
-                <a:cs typeface="Trebuchet MS"/>
-              </a:rPr>
+              <a:rPr lang="en-US" sz="3600" b="1" dirty="0" smtClean="0"/>
               <a:t>Example dataset: gut </a:t>
             </a:r>
             <a:r>
-              <a:rPr lang="en-US" sz="3600" b="1" dirty="0" err="1" smtClean="0">
-                <a:latin typeface="Trebuchet MS"/>
-                <a:cs typeface="Trebuchet MS"/>
-              </a:rPr>
+              <a:rPr lang="en-US" sz="3600" b="1" dirty="0" err="1" smtClean="0"/>
               <a:t>microbiota</a:t>
             </a:r>
             <a:r>
-              <a:rPr lang="en-US" sz="3600" b="1" dirty="0" smtClean="0">
-                <a:latin typeface="Trebuchet MS"/>
-                <a:cs typeface="Trebuchet MS"/>
-              </a:rPr>
+              <a:rPr lang="en-US" sz="3600" b="1" dirty="0" smtClean="0"/>
               <a:t> following antibiotic treatment</a:t>
             </a:r>
-            <a:endParaRPr lang="en-US" sz="3600" b="1" dirty="0">
-              <a:latin typeface="Trebuchet MS"/>
-              <a:cs typeface="Trebuchet MS"/>
-            </a:endParaRPr>
+            <a:endParaRPr lang="en-US" sz="3600" b="1" dirty="0"/>
           </a:p>
         </p:txBody>
       </p:sp>
@@ -3945,9 +3832,9 @@
             <a:avLst/>
           </a:prstGeom>
           <a:solidFill>
-            <a:schemeClr val="accent3">
-              <a:lumMod val="40000"/>
-              <a:lumOff val="60000"/>
+            <a:schemeClr val="accent6">
+              <a:lumMod val="60000"/>
+              <a:lumOff val="40000"/>
             </a:schemeClr>
           </a:solidFill>
         </p:spPr>
@@ -3958,16 +3845,10 @@
           <a:lstStyle/>
           <a:p>
             <a:r>
-              <a:rPr lang="en-US" sz="4000" dirty="0" smtClean="0">
-                <a:latin typeface="Trebuchet MS"/>
-                <a:cs typeface="Trebuchet MS"/>
-              </a:rPr>
+              <a:rPr lang="en-US" sz="4000" dirty="0" smtClean="0"/>
               <a:t>Antibiotics</a:t>
             </a:r>
-            <a:endParaRPr lang="en-US" sz="4000" dirty="0">
-              <a:latin typeface="Trebuchet MS"/>
-              <a:cs typeface="Trebuchet MS"/>
-            </a:endParaRPr>
+            <a:endParaRPr lang="en-US" sz="4000" dirty="0"/>
           </a:p>
         </p:txBody>
       </p:sp>
@@ -3979,8 +3860,8 @@
         </p:nvSpPr>
         <p:spPr>
           <a:xfrm>
-            <a:off x="14476494" y="9929671"/>
-            <a:ext cx="2083974" cy="707886"/>
+            <a:off x="14476494" y="9493136"/>
+            <a:ext cx="1876335" cy="707886"/>
           </a:xfrm>
           <a:prstGeom prst="rect">
             <a:avLst/>
@@ -3996,16 +3877,10 @@
           <a:lstStyle/>
           <a:p>
             <a:r>
-              <a:rPr lang="en-US" sz="4000" dirty="0" smtClean="0">
-                <a:latin typeface="Trebuchet MS"/>
-                <a:cs typeface="Trebuchet MS"/>
-              </a:rPr>
-              <a:t>Controls</a:t>
-            </a:r>
-            <a:endParaRPr lang="en-US" sz="4000" dirty="0">
-              <a:latin typeface="Trebuchet MS"/>
-              <a:cs typeface="Trebuchet MS"/>
-            </a:endParaRPr>
+              <a:rPr lang="en-US" sz="4000" dirty="0" smtClean="0"/>
+              <a:t>Control</a:t>
+            </a:r>
+            <a:endParaRPr lang="en-US" sz="4000" dirty="0"/>
           </a:p>
         </p:txBody>
       </p:sp>
@@ -4017,7 +3892,7 @@
         </p:nvSpPr>
         <p:spPr>
           <a:xfrm>
-            <a:off x="15174959" y="8846514"/>
+            <a:off x="15214644" y="8806829"/>
             <a:ext cx="5907655" cy="1077218"/>
           </a:xfrm>
           <a:prstGeom prst="rect">
@@ -4033,16 +3908,10 @@
           <a:p>
             <a:pPr algn="ctr"/>
             <a:r>
-              <a:rPr lang="en-US" sz="3200" dirty="0" smtClean="0">
-                <a:latin typeface="Trebuchet MS"/>
-                <a:cs typeface="Trebuchet MS"/>
-              </a:rPr>
+              <a:rPr lang="en-US" sz="3200" dirty="0" smtClean="0"/>
               <a:t>Samples from 2 days and 6 weeks following</a:t>
             </a:r>
-            <a:endParaRPr lang="en-US" sz="3200" dirty="0">
-              <a:latin typeface="Trebuchet MS"/>
-              <a:cs typeface="Trebuchet MS"/>
-            </a:endParaRPr>
+            <a:endParaRPr lang="en-US" sz="3200" dirty="0"/>
           </a:p>
         </p:txBody>
       </p:sp>
@@ -4054,16 +3923,16 @@
         </p:nvSpPr>
         <p:spPr>
           <a:xfrm>
-            <a:off x="17807746" y="30424429"/>
+            <a:off x="18083791" y="30645313"/>
             <a:ext cx="2459628" cy="646331"/>
           </a:xfrm>
           <a:prstGeom prst="rect">
             <a:avLst/>
           </a:prstGeom>
           <a:solidFill>
-            <a:schemeClr val="accent5">
-              <a:lumMod val="20000"/>
-              <a:lumOff val="80000"/>
+            <a:schemeClr val="accent3">
+              <a:lumMod val="60000"/>
+              <a:lumOff val="40000"/>
             </a:schemeClr>
           </a:solidFill>
         </p:spPr>
@@ -4074,16 +3943,10 @@
           <a:lstStyle/>
           <a:p>
             <a:r>
-              <a:rPr lang="en-US" sz="3600" dirty="0" smtClean="0">
-                <a:latin typeface="Trebuchet MS"/>
-                <a:cs typeface="Trebuchet MS"/>
-              </a:rPr>
+              <a:rPr lang="en-US" sz="3600" dirty="0" smtClean="0"/>
               <a:t>References</a:t>
             </a:r>
-            <a:endParaRPr lang="en-US" sz="3600" dirty="0">
-              <a:latin typeface="Trebuchet MS"/>
-              <a:cs typeface="Trebuchet MS"/>
-            </a:endParaRPr>
+            <a:endParaRPr lang="en-US" sz="3600" dirty="0"/>
           </a:p>
         </p:txBody>
       </p:sp>
@@ -4095,7 +3958,7 @@
         </p:nvSpPr>
         <p:spPr>
           <a:xfrm>
-            <a:off x="16140785" y="31161353"/>
+            <a:off x="16416830" y="31382237"/>
             <a:ext cx="5326043" cy="1323439"/>
           </a:xfrm>
           <a:prstGeom prst="rect">
@@ -4110,192 +3973,343 @@
           <a:lstStyle/>
           <a:p>
             <a:r>
-              <a:rPr lang="en-US" sz="2000" dirty="0" err="1" smtClean="0">
-                <a:latin typeface="Trebuchet MS"/>
-                <a:cs typeface="Trebuchet MS"/>
-              </a:rPr>
+              <a:rPr lang="en-US" sz="2000" dirty="0" err="1" smtClean="0"/>
               <a:t>Theriot</a:t>
             </a:r>
             <a:r>
-              <a:rPr lang="en-US" sz="2000" dirty="0" smtClean="0">
-                <a:latin typeface="Trebuchet MS"/>
-                <a:cs typeface="Trebuchet MS"/>
-              </a:rPr>
+              <a:rPr lang="en-US" sz="2000" dirty="0" smtClean="0"/>
               <a:t> </a:t>
             </a:r>
             <a:r>
-              <a:rPr lang="en-US" sz="2000" dirty="0">
-                <a:latin typeface="Trebuchet MS"/>
-                <a:cs typeface="Trebuchet MS"/>
-              </a:rPr>
+              <a:rPr lang="en-US" sz="2000" dirty="0"/>
               <a:t>et al (2014) </a:t>
             </a:r>
             <a:r>
-              <a:rPr lang="en-US" sz="2000" i="1" dirty="0">
-                <a:latin typeface="Trebuchet MS"/>
-                <a:cs typeface="Trebuchet MS"/>
-              </a:rPr>
+              <a:rPr lang="en-US" sz="2000" i="1" dirty="0"/>
               <a:t>Nature Communications</a:t>
             </a:r>
           </a:p>
           <a:p>
             <a:r>
-              <a:rPr lang="en-US" sz="2000" dirty="0" smtClean="0">
-                <a:latin typeface="Trebuchet MS"/>
-                <a:cs typeface="Trebuchet MS"/>
-              </a:rPr>
+              <a:rPr lang="en-US" sz="2000" dirty="0" smtClean="0"/>
               <a:t>HMP Consortium (2012) </a:t>
             </a:r>
             <a:r>
-              <a:rPr lang="en-US" sz="2000" i="1" dirty="0" smtClean="0">
-                <a:latin typeface="Trebuchet MS"/>
-                <a:cs typeface="Trebuchet MS"/>
-              </a:rPr>
+              <a:rPr lang="en-US" sz="2000" i="1" dirty="0" smtClean="0"/>
               <a:t>Nature</a:t>
             </a:r>
           </a:p>
           <a:p>
             <a:r>
-              <a:rPr lang="en-US" sz="2000" dirty="0" err="1" smtClean="0">
-                <a:latin typeface="Trebuchet MS"/>
-                <a:cs typeface="Trebuchet MS"/>
-              </a:rPr>
+              <a:rPr lang="en-US" sz="2000" dirty="0" err="1" smtClean="0"/>
               <a:t>Treangen</a:t>
             </a:r>
             <a:r>
-              <a:rPr lang="en-US" sz="2000" dirty="0" smtClean="0">
-                <a:latin typeface="Trebuchet MS"/>
-                <a:cs typeface="Trebuchet MS"/>
-              </a:rPr>
+              <a:rPr lang="en-US" sz="2000" dirty="0" smtClean="0"/>
               <a:t> et al (2013) </a:t>
             </a:r>
             <a:r>
-              <a:rPr lang="en-US" sz="2000" i="1" dirty="0" smtClean="0">
-                <a:latin typeface="Trebuchet MS"/>
-                <a:cs typeface="Trebuchet MS"/>
-              </a:rPr>
+              <a:rPr lang="en-US" sz="2000" i="1" dirty="0" smtClean="0"/>
               <a:t>Genome Biology</a:t>
             </a:r>
-            <a:endParaRPr lang="en-US" sz="2000" dirty="0" smtClean="0">
-              <a:latin typeface="Trebuchet MS"/>
-              <a:cs typeface="Trebuchet MS"/>
-            </a:endParaRPr>
-          </a:p>
-          <a:p>
-            <a:r>
-              <a:rPr lang="en-US" sz="2000" dirty="0">
-                <a:latin typeface="Trebuchet MS"/>
-                <a:cs typeface="Trebuchet MS"/>
-              </a:rPr>
+            <a:endParaRPr lang="en-US" sz="2000" dirty="0" smtClean="0"/>
+          </a:p>
+          <a:p>
+            <a:r>
+              <a:rPr lang="en-US" sz="2000" dirty="0"/>
               <a:t>Manor et al (2015) in </a:t>
             </a:r>
             <a:r>
-              <a:rPr lang="en-US" sz="2000" dirty="0" smtClean="0">
-                <a:latin typeface="Trebuchet MS"/>
-                <a:cs typeface="Trebuchet MS"/>
-              </a:rPr>
+              <a:rPr lang="en-US" sz="2000" dirty="0" smtClean="0"/>
               <a:t>preparation</a:t>
             </a:r>
-            <a:endParaRPr lang="en-US" sz="2000" dirty="0">
-              <a:latin typeface="Trebuchet MS"/>
-              <a:cs typeface="Trebuchet MS"/>
-            </a:endParaRPr>
-          </a:p>
-        </p:txBody>
-      </p:sp>
-      <p:sp>
-        <p:nvSpPr>
-          <p:cNvPr id="31" name="TextBox 30"/>
-          <p:cNvSpPr txBox="1"/>
+            <a:endParaRPr lang="en-US" sz="2000" dirty="0"/>
+          </a:p>
+        </p:txBody>
+      </p:sp>
+      <p:pic>
+        <p:nvPicPr>
+          <p:cNvPr id="23" name="Shape 37"/>
+          <p:cNvPicPr preferRelativeResize="0"/>
           <p:nvPr/>
-        </p:nvSpPr>
-        <p:spPr>
-          <a:xfrm>
-            <a:off x="6865437" y="11919240"/>
-            <a:ext cx="2623482" cy="2062103"/>
+        </p:nvPicPr>
+        <p:blipFill>
+          <a:blip r:embed="rId8">
+            <a:alphaModFix/>
+          </a:blip>
+          <a:stretch>
+            <a:fillRect/>
+          </a:stretch>
+        </p:blipFill>
+        <p:spPr>
+          <a:xfrm>
+            <a:off x="1700905" y="11309190"/>
+            <a:ext cx="1518984" cy="1408754"/>
           </a:xfrm>
           <a:prstGeom prst="rect">
             <a:avLst/>
           </a:prstGeom>
           <a:noFill/>
-        </p:spPr>
-        <p:txBody>
-          <a:bodyPr wrap="square" rtlCol="0">
+          <a:ln>
+            <a:noFill/>
+          </a:ln>
+        </p:spPr>
+      </p:pic>
+      <p:pic>
+        <p:nvPicPr>
+          <p:cNvPr id="27" name="Shape 38"/>
+          <p:cNvPicPr preferRelativeResize="0"/>
+          <p:nvPr/>
+        </p:nvPicPr>
+        <p:blipFill>
+          <a:blip r:embed="rId9">
+            <a:clrChange>
+              <a:clrFrom>
+                <a:srgbClr val="000000"/>
+              </a:clrFrom>
+              <a:clrTo>
+                <a:srgbClr val="000000">
+                  <a:alpha val="0"/>
+                </a:srgbClr>
+              </a:clrTo>
+            </a:clrChange>
+            <a:alphaModFix/>
+          </a:blip>
+          <a:stretch>
+            <a:fillRect/>
+          </a:stretch>
+        </p:blipFill>
+        <p:spPr>
+          <a:xfrm>
+            <a:off x="1670810" y="12898420"/>
+            <a:ext cx="1549079" cy="1425385"/>
+          </a:xfrm>
+          <a:prstGeom prst="rect">
+            <a:avLst/>
+          </a:prstGeom>
+          <a:noFill/>
+          <a:ln>
+            <a:noFill/>
+          </a:ln>
+        </p:spPr>
+      </p:pic>
+      <p:sp>
+        <p:nvSpPr>
+          <p:cNvPr id="3" name="TextBox 2"/>
+          <p:cNvSpPr txBox="1"/>
+          <p:nvPr/>
+        </p:nvSpPr>
+        <p:spPr>
+          <a:xfrm>
+            <a:off x="917156" y="10513208"/>
+            <a:ext cx="2883647" cy="646331"/>
+          </a:xfrm>
+          <a:prstGeom prst="rect">
+            <a:avLst/>
+          </a:prstGeom>
+          <a:noFill/>
+        </p:spPr>
+        <p:txBody>
+          <a:bodyPr wrap="none" rtlCol="0">
             <a:spAutoFit/>
           </a:bodyPr>
           <a:lstStyle/>
           <a:p>
             <a:r>
-              <a:rPr lang="en-US" sz="3200" dirty="0" smtClean="0">
-                <a:latin typeface="Trebuchet MS"/>
-                <a:cs typeface="Trebuchet MS"/>
-              </a:rPr>
-              <a:t>will remake this schematic later</a:t>
-            </a:r>
-            <a:endParaRPr lang="en-US" sz="3200" dirty="0">
-              <a:latin typeface="Trebuchet MS"/>
-              <a:cs typeface="Trebuchet MS"/>
-            </a:endParaRPr>
-          </a:p>
-        </p:txBody>
-      </p:sp>
-      <p:sp>
-        <p:nvSpPr>
-          <p:cNvPr id="28" name="Rectangle 27"/>
+              <a:rPr lang="en-US" sz="3600" dirty="0" smtClean="0"/>
+              <a:t>Species/Taxa</a:t>
+            </a:r>
+            <a:endParaRPr lang="en-US" sz="3600" dirty="0"/>
+          </a:p>
+        </p:txBody>
+      </p:sp>
+      <p:sp>
+        <p:nvSpPr>
+          <p:cNvPr id="28" name="TextBox 27"/>
+          <p:cNvSpPr txBox="1"/>
+          <p:nvPr/>
+        </p:nvSpPr>
+        <p:spPr>
+          <a:xfrm>
+            <a:off x="5303896" y="10513208"/>
+            <a:ext cx="3658649" cy="646331"/>
+          </a:xfrm>
+          <a:prstGeom prst="rect">
+            <a:avLst/>
+          </a:prstGeom>
+          <a:noFill/>
+        </p:spPr>
+        <p:txBody>
+          <a:bodyPr wrap="none" rtlCol="0">
+            <a:spAutoFit/>
+          </a:bodyPr>
+          <a:lstStyle/>
+          <a:p>
+            <a:r>
+              <a:rPr lang="en-US" sz="3600" dirty="0" smtClean="0"/>
+              <a:t>Genes/Functions</a:t>
+            </a:r>
+            <a:endParaRPr lang="en-US" sz="3600" dirty="0"/>
+          </a:p>
+        </p:txBody>
+      </p:sp>
+      <p:sp>
+        <p:nvSpPr>
+          <p:cNvPr id="5" name="TextBox 4"/>
+          <p:cNvSpPr txBox="1"/>
+          <p:nvPr/>
+        </p:nvSpPr>
+        <p:spPr>
+          <a:xfrm>
+            <a:off x="293255" y="11454386"/>
+            <a:ext cx="1345866" cy="954107"/>
+          </a:xfrm>
+          <a:prstGeom prst="rect">
+            <a:avLst/>
+          </a:prstGeom>
+          <a:noFill/>
+        </p:spPr>
+        <p:txBody>
+          <a:bodyPr wrap="none" rtlCol="0">
+            <a:spAutoFit/>
+          </a:bodyPr>
+          <a:lstStyle/>
+          <a:p>
+            <a:pPr algn="ctr"/>
+            <a:r>
+              <a:rPr lang="en-US" sz="2800" dirty="0" smtClean="0"/>
+              <a:t>Sample</a:t>
+            </a:r>
+          </a:p>
+          <a:p>
+            <a:pPr algn="ctr"/>
+            <a:r>
+              <a:rPr lang="en-US" sz="2800" dirty="0" smtClean="0"/>
+              <a:t>1</a:t>
+            </a:r>
+          </a:p>
+        </p:txBody>
+      </p:sp>
+      <p:sp>
+        <p:nvSpPr>
+          <p:cNvPr id="18" name="Rectangle 17"/>
           <p:cNvSpPr/>
           <p:nvPr/>
         </p:nvSpPr>
         <p:spPr>
           <a:xfrm>
-            <a:off x="152400" y="7274319"/>
-            <a:ext cx="9712499" cy="1200329"/>
+            <a:off x="263159" y="13124750"/>
+            <a:ext cx="1345866" cy="954107"/>
+          </a:xfrm>
+          <a:prstGeom prst="rect">
+            <a:avLst/>
+          </a:prstGeom>
+        </p:spPr>
+        <p:txBody>
+          <a:bodyPr wrap="none">
+            <a:spAutoFit/>
+          </a:bodyPr>
+          <a:lstStyle/>
+          <a:p>
+            <a:pPr algn="ctr"/>
+            <a:r>
+              <a:rPr lang="en-US" sz="2800" dirty="0" smtClean="0"/>
+              <a:t>Sample</a:t>
+            </a:r>
+          </a:p>
+          <a:p>
+            <a:pPr algn="ctr"/>
+            <a:r>
+              <a:rPr lang="en-US" sz="2800" dirty="0" smtClean="0"/>
+              <a:t>2</a:t>
+            </a:r>
+            <a:endParaRPr lang="en-US" sz="2800" dirty="0"/>
+          </a:p>
+        </p:txBody>
+      </p:sp>
+      <p:sp>
+        <p:nvSpPr>
+          <p:cNvPr id="19" name="TextBox 18"/>
+          <p:cNvSpPr txBox="1"/>
+          <p:nvPr/>
+        </p:nvSpPr>
+        <p:spPr>
+          <a:xfrm>
+            <a:off x="5878555" y="11645522"/>
+            <a:ext cx="2637711" cy="646331"/>
           </a:xfrm>
           <a:prstGeom prst="rect">
             <a:avLst/>
           </a:prstGeom>
           <a:solidFill>
-            <a:schemeClr val="accent2">
-              <a:lumMod val="60000"/>
-              <a:lumOff val="40000"/>
+            <a:schemeClr val="bg1">
+              <a:lumMod val="85000"/>
             </a:schemeClr>
           </a:solidFill>
         </p:spPr>
         <p:txBody>
-          <a:bodyPr wrap="none" lIns="365760" tIns="91440" rIns="365760" bIns="91440">
+          <a:bodyPr wrap="none" rtlCol="0">
             <a:spAutoFit/>
           </a:bodyPr>
           <a:lstStyle/>
           <a:p>
             <a:r>
-              <a:rPr lang="en-US" sz="6600" dirty="0">
-                <a:latin typeface="Trebuchet MS"/>
-                <a:cs typeface="Trebuchet MS"/>
-              </a:rPr>
-              <a:t>Motivation and Problem</a:t>
-            </a:r>
-          </a:p>
-        </p:txBody>
-      </p:sp>
-      <p:sp>
-        <p:nvSpPr>
-          <p:cNvPr id="2" name="TextBox 1"/>
-          <p:cNvSpPr txBox="1"/>
+              <a:rPr lang="en-US" sz="3600" dirty="0" smtClean="0"/>
+              <a:t>2A 4B 5C 4D</a:t>
+            </a:r>
+          </a:p>
+        </p:txBody>
+      </p:sp>
+      <p:sp>
+        <p:nvSpPr>
+          <p:cNvPr id="21" name="Rectangle 20"/>
+          <p:cNvSpPr/>
           <p:nvPr/>
         </p:nvSpPr>
         <p:spPr>
           <a:xfrm>
-            <a:off x="360172" y="24020584"/>
-            <a:ext cx="6389226" cy="1323439"/>
+            <a:off x="5859879" y="13237642"/>
+            <a:ext cx="2656388" cy="646331"/>
           </a:xfrm>
           <a:prstGeom prst="rect">
             <a:avLst/>
           </a:prstGeom>
           <a:solidFill>
-            <a:schemeClr val="accent2">
-              <a:lumMod val="60000"/>
-              <a:lumOff val="40000"/>
-            </a:schemeClr>
+            <a:srgbClr val="D9D9D9"/>
           </a:solidFill>
+        </p:spPr>
+        <p:txBody>
+          <a:bodyPr wrap="square">
+            <a:spAutoFit/>
+          </a:bodyPr>
+          <a:lstStyle/>
+          <a:p>
+            <a:r>
+              <a:rPr lang="en-US" sz="3600" dirty="0" smtClean="0"/>
+              <a:t>4A </a:t>
+            </a:r>
+            <a:r>
+              <a:rPr lang="en-US" sz="3600" dirty="0"/>
+              <a:t>3B 4C 1D</a:t>
+            </a:r>
+          </a:p>
+        </p:txBody>
+      </p:sp>
+      <p:sp>
+        <p:nvSpPr>
+          <p:cNvPr id="31" name="TextBox 30"/>
+          <p:cNvSpPr txBox="1"/>
+          <p:nvPr/>
+        </p:nvSpPr>
+        <p:spPr>
+          <a:xfrm>
+            <a:off x="11377848" y="11531959"/>
+            <a:ext cx="10077963" cy="1754327"/>
+          </a:xfrm>
+          <a:prstGeom prst="rect">
+            <a:avLst/>
+          </a:prstGeom>
+          <a:noFill/>
         </p:spPr>
         <p:txBody>
           <a:bodyPr wrap="square" rtlCol="0">
@@ -4304,29 +4318,157 @@
           <a:lstStyle/>
           <a:p>
             <a:r>
-              <a:rPr lang="en-US" sz="4000" b="1" dirty="0" smtClean="0">
+              <a:rPr lang="en-US" sz="3600" b="1" dirty="0" smtClean="0">
+                <a:latin typeface="Trebuchet MS"/>
+                <a:cs typeface="Trebuchet MS"/>
+              </a:rPr>
+              <a:t>Something about how the data was stored(tree structure) + the use of bipartite graph as a dashboard</a:t>
+            </a:r>
+            <a:endParaRPr lang="en-US" sz="3600" b="1" dirty="0">
+              <a:latin typeface="Trebuchet MS"/>
+              <a:cs typeface="Trebuchet MS"/>
+            </a:endParaRPr>
+          </a:p>
+        </p:txBody>
+      </p:sp>
+      <p:pic>
+        <p:nvPicPr>
+          <p:cNvPr id="32" name="Picture 31" descr="bipartiteexpanded.png"/>
+          <p:cNvPicPr>
+            <a:picLocks noChangeAspect="1"/>
+          </p:cNvPicPr>
+          <p:nvPr/>
+        </p:nvPicPr>
+        <p:blipFill>
+          <a:blip r:embed="rId10">
+            <a:extLst>
+              <a:ext uri="{28A0092B-C50C-407E-A947-70E740481C1C}">
+                <a14:useLocalDpi xmlns:a14="http://schemas.microsoft.com/office/drawing/2010/main" val="0"/>
+              </a:ext>
+            </a:extLst>
+          </a:blip>
+          <a:stretch>
+            <a:fillRect/>
+          </a:stretch>
+        </p:blipFill>
+        <p:spPr>
+          <a:xfrm>
+            <a:off x="11819383" y="13286286"/>
+            <a:ext cx="4647478" cy="3803133"/>
+          </a:xfrm>
+          <a:prstGeom prst="rect">
+            <a:avLst/>
+          </a:prstGeom>
+        </p:spPr>
+      </p:pic>
+      <p:pic>
+        <p:nvPicPr>
+          <p:cNvPr id="33" name="Picture 32" descr="bipartitehighlighted.png"/>
+          <p:cNvPicPr>
+            <a:picLocks noChangeAspect="1"/>
+          </p:cNvPicPr>
+          <p:nvPr/>
+        </p:nvPicPr>
+        <p:blipFill>
+          <a:blip r:embed="rId11">
+            <a:extLst>
+              <a:ext uri="{28A0092B-C50C-407E-A947-70E740481C1C}">
+                <a14:useLocalDpi xmlns:a14="http://schemas.microsoft.com/office/drawing/2010/main" val="0"/>
+              </a:ext>
+            </a:extLst>
+          </a:blip>
+          <a:stretch>
+            <a:fillRect/>
+          </a:stretch>
+        </p:blipFill>
+        <p:spPr>
+          <a:xfrm>
+            <a:off x="16678520" y="13027976"/>
+            <a:ext cx="5159915" cy="4222471"/>
+          </a:xfrm>
+          <a:prstGeom prst="rect">
+            <a:avLst/>
+          </a:prstGeom>
+        </p:spPr>
+      </p:pic>
+      <p:sp>
+        <p:nvSpPr>
+          <p:cNvPr id="34" name="TextBox 33"/>
+          <p:cNvSpPr txBox="1"/>
+          <p:nvPr/>
+        </p:nvSpPr>
+        <p:spPr>
+          <a:xfrm>
+            <a:off x="254151" y="23199553"/>
+            <a:ext cx="6389226" cy="1938992"/>
+          </a:xfrm>
+          <a:prstGeom prst="rect">
+            <a:avLst/>
+          </a:prstGeom>
+          <a:solidFill>
+            <a:srgbClr val="FEC67A"/>
+          </a:solidFill>
+        </p:spPr>
+        <p:txBody>
+          <a:bodyPr wrap="square" rtlCol="0">
+            <a:spAutoFit/>
+          </a:bodyPr>
+          <a:lstStyle/>
+          <a:p>
+            <a:r>
+              <a:rPr lang="en-US" sz="6000" b="1" dirty="0" smtClean="0">
                 <a:cs typeface="Trebuchet MS"/>
               </a:rPr>
               <a:t> Challenges </a:t>
             </a:r>
             <a:r>
-              <a:rPr lang="en-US" sz="4000" b="1" dirty="0">
+              <a:rPr lang="en-US" sz="6000" b="1" dirty="0">
                 <a:cs typeface="Trebuchet MS"/>
               </a:rPr>
               <a:t>and Previous </a:t>
             </a:r>
             <a:r>
-              <a:rPr lang="en-US" sz="4000" b="1" dirty="0" smtClean="0">
+              <a:rPr lang="en-US" sz="6000" b="1" dirty="0" smtClean="0">
                 <a:cs typeface="Trebuchet MS"/>
               </a:rPr>
               <a:t> Work:</a:t>
             </a:r>
-            <a:endParaRPr lang="en-US" sz="4000" b="1" dirty="0">
+            <a:endParaRPr lang="en-US" sz="6000" b="1" dirty="0">
               <a:cs typeface="Trebuchet MS"/>
             </a:endParaRPr>
           </a:p>
         </p:txBody>
       </p:sp>
+      <p:pic>
+        <p:nvPicPr>
+          <p:cNvPr id="2" name="Picture 1" descr="mice_taxonomic.png"/>
+          <p:cNvPicPr>
+            <a:picLocks noChangeAspect="1"/>
+          </p:cNvPicPr>
+          <p:nvPr/>
+        </p:nvPicPr>
+        <p:blipFill>
+          <a:blip r:embed="rId12">
+            <a:extLst>
+              <a:ext uri="{28A0092B-C50C-407E-A947-70E740481C1C}">
+                <a14:useLocalDpi xmlns:a14="http://schemas.microsoft.com/office/drawing/2010/main" val="0"/>
+              </a:ext>
+            </a:extLst>
+          </a:blip>
+          <a:stretch>
+            <a:fillRect/>
+          </a:stretch>
+        </p:blipFill>
+        <p:spPr>
+          <a:xfrm>
+            <a:off x="17740497" y="17089419"/>
+            <a:ext cx="3570143" cy="2939790"/>
+          </a:xfrm>
+          <a:prstGeom prst="rect">
+            <a:avLst/>
+          </a:prstGeom>
+        </p:spPr>
+      </p:pic>
     </p:spTree>
     <p:extLst>
       <p:ext uri="{BB962C8B-B14F-4D97-AF65-F5344CB8AC3E}">
@@ -4421,7 +4563,7 @@
 <file path=ppt/theme/theme1.xml><?xml version="1.0" encoding="utf-8"?>
 <a:theme xmlns:a="http://schemas.openxmlformats.org/drawingml/2006/main" name="Office Theme">
   <a:themeElements>
-    <a:clrScheme name="Kilter">
+    <a:clrScheme name="Twilight">
       <a:dk1>
         <a:sysClr val="windowText" lastClr="000000"/>
       </a:dk1>
@@ -4429,34 +4571,34 @@
         <a:sysClr val="window" lastClr="FFFFFF"/>
       </a:lt1>
       <a:dk2>
-        <a:srgbClr val="318FC5"/>
+        <a:srgbClr val="24213E"/>
       </a:dk2>
       <a:lt2>
-        <a:srgbClr val="AEE8FB"/>
+        <a:srgbClr val="E9EAF0"/>
       </a:lt2>
       <a:accent1>
-        <a:srgbClr val="76C5EF"/>
+        <a:srgbClr val="E8BC4A"/>
       </a:accent1>
       <a:accent2>
-        <a:srgbClr val="FEA022"/>
+        <a:srgbClr val="83C1C6"/>
       </a:accent2>
       <a:accent3>
-        <a:srgbClr val="FF6700"/>
+        <a:srgbClr val="E78D35"/>
       </a:accent3>
       <a:accent4>
-        <a:srgbClr val="70A525"/>
+        <a:srgbClr val="909CE1"/>
       </a:accent4>
       <a:accent5>
-        <a:srgbClr val="A5D848"/>
+        <a:srgbClr val="839C41"/>
       </a:accent5>
       <a:accent6>
-        <a:srgbClr val="20768C"/>
+        <a:srgbClr val="CC5439"/>
       </a:accent6>
       <a:hlink>
-        <a:srgbClr val="7AB6E8"/>
+        <a:srgbClr val="1C6CF1"/>
       </a:hlink>
       <a:folHlink>
-        <a:srgbClr val="83B0D3"/>
+        <a:srgbClr val="C649E0"/>
       </a:folHlink>
     </a:clrScheme>
     <a:fontScheme name="Revolution">
@@ -4685,15 +4827,6 @@
 </file>
 
 <file path=customXml/item1.xml><?xml version="1.0" encoding="utf-8"?>
-<p:properties xmlns:p="http://schemas.microsoft.com/office/2006/metadata/properties" xmlns:xsi="http://www.w3.org/2001/XMLSchema-instance" xmlns:pc="http://schemas.microsoft.com/office/infopath/2007/PartnerControls">
-  <documentManagement>
-    <_Version xmlns="http://schemas.microsoft.com/sharepoint/v3/fields" xsi:nil="true"/>
-    <_Status xmlns="http://schemas.microsoft.com/sharepoint/v3/fields">Not Started</_Status>
-  </documentManagement>
-</p:properties>
-</file>
-
-<file path=customXml/item2.xml><?xml version="1.0" encoding="utf-8"?>
 <ct:contentTypeSchema xmlns:ct="http://schemas.microsoft.com/office/2006/metadata/contentType" xmlns:ma="http://schemas.microsoft.com/office/2006/metadata/properties/metaAttributes" ct:_="" ma:_="" ma:contentTypeName="Document" ma:contentTypeID="0x0101000DE64AEEDD9B7A4D93545ACBE97D4615" ma:contentTypeVersion="2" ma:contentTypeDescription="Create a new document." ma:contentTypeScope="" ma:versionID="f49002b78e3a4a71b814eef46a983816">
   <xsd:schema xmlns:xsd="http://www.w3.org/2001/XMLSchema" xmlns:xs="http://www.w3.org/2001/XMLSchema" xmlns:p="http://schemas.microsoft.com/office/2006/metadata/properties" xmlns:ns2="http://schemas.microsoft.com/sharepoint/v3/fields" targetNamespace="http://schemas.microsoft.com/office/2006/metadata/properties" ma:root="true" ma:fieldsID="38f6db2dd0d9a0cf6a8dc37be32b365b" ns2:_="">
     <xsd:import namespace="http://schemas.microsoft.com/sharepoint/v3/fields"/>
@@ -4837,7 +4970,7 @@
 </ct:contentTypeSchema>
 </file>
 
-<file path=customXml/item3.xml><?xml version="1.0" encoding="utf-8"?>
+<file path=customXml/item2.xml><?xml version="1.0" encoding="utf-8"?>
 <?mso-contentType ?>
 <FormTemplates xmlns="http://schemas.microsoft.com/sharepoint/v3/contenttype/forms">
   <Display>DocumentLibraryForm</Display>
@@ -4846,17 +4979,16 @@
 </FormTemplates>
 </file>
 
-<file path=customXml/itemProps1.xml><?xml version="1.0" encoding="utf-8"?>
-<ds:datastoreItem xmlns:ds="http://schemas.openxmlformats.org/officeDocument/2006/customXml" ds:itemID="{7B6F2769-7194-4217-93D3-3AF3A4742282}">
-  <ds:schemaRefs>
-    <ds:schemaRef ds:uri="http://schemas.microsoft.com/office/2006/metadata/properties"/>
-    <ds:schemaRef ds:uri="http://schemas.microsoft.com/office/infopath/2007/PartnerControls"/>
-    <ds:schemaRef ds:uri="http://schemas.microsoft.com/sharepoint/v3/fields"/>
-  </ds:schemaRefs>
-</ds:datastoreItem>
+<file path=customXml/item3.xml><?xml version="1.0" encoding="utf-8"?>
+<p:properties xmlns:p="http://schemas.microsoft.com/office/2006/metadata/properties" xmlns:xsi="http://www.w3.org/2001/XMLSchema-instance" xmlns:pc="http://schemas.microsoft.com/office/infopath/2007/PartnerControls">
+  <documentManagement>
+    <_Version xmlns="http://schemas.microsoft.com/sharepoint/v3/fields" xsi:nil="true"/>
+    <_Status xmlns="http://schemas.microsoft.com/sharepoint/v3/fields">Not Started</_Status>
+  </documentManagement>
+</p:properties>
 </file>
 
-<file path=customXml/itemProps2.xml><?xml version="1.0" encoding="utf-8"?>
+<file path=customXml/itemProps1.xml><?xml version="1.0" encoding="utf-8"?>
 <ds:datastoreItem xmlns:ds="http://schemas.openxmlformats.org/officeDocument/2006/customXml" ds:itemID="{E4214858-785C-42F7-BE66-6D0E79395FC8}">
   <ds:schemaRefs>
     <ds:schemaRef ds:uri="http://schemas.microsoft.com/office/2006/metadata/contentType"/>
@@ -4874,10 +5006,20 @@
 </ds:datastoreItem>
 </file>
 
-<file path=customXml/itemProps3.xml><?xml version="1.0" encoding="utf-8"?>
+<file path=customXml/itemProps2.xml><?xml version="1.0" encoding="utf-8"?>
 <ds:datastoreItem xmlns:ds="http://schemas.openxmlformats.org/officeDocument/2006/customXml" ds:itemID="{87D2A1B0-FF3E-4009-940D-AED0EB70AA20}">
   <ds:schemaRefs>
     <ds:schemaRef ds:uri="http://schemas.microsoft.com/sharepoint/v3/contenttype/forms"/>
   </ds:schemaRefs>
 </ds:datastoreItem>
+</file>
+
+<file path=customXml/itemProps3.xml><?xml version="1.0" encoding="utf-8"?>
+<ds:datastoreItem xmlns:ds="http://schemas.openxmlformats.org/officeDocument/2006/customXml" ds:itemID="{7B6F2769-7194-4217-93D3-3AF3A4742282}">
+  <ds:schemaRefs>
+    <ds:schemaRef ds:uri="http://schemas.microsoft.com/office/2006/metadata/properties"/>
+    <ds:schemaRef ds:uri="http://schemas.microsoft.com/office/infopath/2007/PartnerControls"/>
+    <ds:schemaRef ds:uri="http://schemas.microsoft.com/sharepoint/v3/fields"/>
+  </ds:schemaRefs>
+</ds:datastoreItem>
 </file>
</xml_diff>